<commit_message>
Adding data visualization lecture
</commit_message>
<xml_diff>
--- a/human-computer-interaction/slides/diagrams.pptx
+++ b/human-computer-interaction/slides/diagrams.pptx
@@ -6,6 +6,7 @@
   </p:sldMasterIdLst>
   <p:sldIdLst>
     <p:sldId id="256" r:id="rId2"/>
+    <p:sldId id="257" r:id="rId3"/>
   </p:sldIdLst>
   <p:sldSz cx="12192000" cy="6858000"/>
   <p:notesSz cx="6858000" cy="9144000"/>
@@ -104,6 +105,11 @@
       </a:defRPr>
     </a:lvl9pPr>
   </p:defaultTextStyle>
+  <p:extLst>
+    <p:ext uri="{EFAFB233-063F-42B5-8137-9DF3F51BA10A}">
+      <p15:sldGuideLst xmlns:p15="http://schemas.microsoft.com/office/powerpoint/2012/main"/>
+    </p:ext>
+  </p:extLst>
 </p:presentation>
 </file>
 
@@ -256,7 +262,7 @@
           <a:p>
             <a:fld id="{9A568872-756E-4185-AFB0-F4ACC864CE89}" type="datetimeFigureOut">
               <a:rPr lang="en-GB" smtClean="0"/>
-              <a:t>29/09/2018</a:t>
+              <a:t>13/10/2018</a:t>
             </a:fld>
             <a:endParaRPr lang="en-GB"/>
           </a:p>
@@ -456,7 +462,7 @@
           <a:p>
             <a:fld id="{9A568872-756E-4185-AFB0-F4ACC864CE89}" type="datetimeFigureOut">
               <a:rPr lang="en-GB" smtClean="0"/>
-              <a:t>29/09/2018</a:t>
+              <a:t>13/10/2018</a:t>
             </a:fld>
             <a:endParaRPr lang="en-GB"/>
           </a:p>
@@ -666,7 +672,7 @@
           <a:p>
             <a:fld id="{9A568872-756E-4185-AFB0-F4ACC864CE89}" type="datetimeFigureOut">
               <a:rPr lang="en-GB" smtClean="0"/>
-              <a:t>29/09/2018</a:t>
+              <a:t>13/10/2018</a:t>
             </a:fld>
             <a:endParaRPr lang="en-GB"/>
           </a:p>
@@ -866,7 +872,7 @@
           <a:p>
             <a:fld id="{9A568872-756E-4185-AFB0-F4ACC864CE89}" type="datetimeFigureOut">
               <a:rPr lang="en-GB" smtClean="0"/>
-              <a:t>29/09/2018</a:t>
+              <a:t>13/10/2018</a:t>
             </a:fld>
             <a:endParaRPr lang="en-GB"/>
           </a:p>
@@ -1142,7 +1148,7 @@
           <a:p>
             <a:fld id="{9A568872-756E-4185-AFB0-F4ACC864CE89}" type="datetimeFigureOut">
               <a:rPr lang="en-GB" smtClean="0"/>
-              <a:t>29/09/2018</a:t>
+              <a:t>13/10/2018</a:t>
             </a:fld>
             <a:endParaRPr lang="en-GB"/>
           </a:p>
@@ -1410,7 +1416,7 @@
           <a:p>
             <a:fld id="{9A568872-756E-4185-AFB0-F4ACC864CE89}" type="datetimeFigureOut">
               <a:rPr lang="en-GB" smtClean="0"/>
-              <a:t>29/09/2018</a:t>
+              <a:t>13/10/2018</a:t>
             </a:fld>
             <a:endParaRPr lang="en-GB"/>
           </a:p>
@@ -1825,7 +1831,7 @@
           <a:p>
             <a:fld id="{9A568872-756E-4185-AFB0-F4ACC864CE89}" type="datetimeFigureOut">
               <a:rPr lang="en-GB" smtClean="0"/>
-              <a:t>29/09/2018</a:t>
+              <a:t>13/10/2018</a:t>
             </a:fld>
             <a:endParaRPr lang="en-GB"/>
           </a:p>
@@ -1967,7 +1973,7 @@
           <a:p>
             <a:fld id="{9A568872-756E-4185-AFB0-F4ACC864CE89}" type="datetimeFigureOut">
               <a:rPr lang="en-GB" smtClean="0"/>
-              <a:t>29/09/2018</a:t>
+              <a:t>13/10/2018</a:t>
             </a:fld>
             <a:endParaRPr lang="en-GB"/>
           </a:p>
@@ -2080,7 +2086,7 @@
           <a:p>
             <a:fld id="{9A568872-756E-4185-AFB0-F4ACC864CE89}" type="datetimeFigureOut">
               <a:rPr lang="en-GB" smtClean="0"/>
-              <a:t>29/09/2018</a:t>
+              <a:t>13/10/2018</a:t>
             </a:fld>
             <a:endParaRPr lang="en-GB"/>
           </a:p>
@@ -2393,7 +2399,7 @@
           <a:p>
             <a:fld id="{9A568872-756E-4185-AFB0-F4ACC864CE89}" type="datetimeFigureOut">
               <a:rPr lang="en-GB" smtClean="0"/>
-              <a:t>29/09/2018</a:t>
+              <a:t>13/10/2018</a:t>
             </a:fld>
             <a:endParaRPr lang="en-GB"/>
           </a:p>
@@ -2682,7 +2688,7 @@
           <a:p>
             <a:fld id="{9A568872-756E-4185-AFB0-F4ACC864CE89}" type="datetimeFigureOut">
               <a:rPr lang="en-GB" smtClean="0"/>
-              <a:t>29/09/2018</a:t>
+              <a:t>13/10/2018</a:t>
             </a:fld>
             <a:endParaRPr lang="en-GB"/>
           </a:p>
@@ -2925,7 +2931,7 @@
           <a:p>
             <a:fld id="{9A568872-756E-4185-AFB0-F4ACC864CE89}" type="datetimeFigureOut">
               <a:rPr lang="en-GB" smtClean="0"/>
-              <a:t>29/09/2018</a:t>
+              <a:t>13/10/2018</a:t>
             </a:fld>
             <a:endParaRPr lang="en-GB"/>
           </a:p>
@@ -3943,6 +3949,556 @@
 </p:sld>
 </file>
 
+<file path=ppt/slides/slide2.xml><?xml version="1.0" encoding="utf-8"?>
+<p:sld xmlns:a="http://schemas.openxmlformats.org/drawingml/2006/main" xmlns:r="http://schemas.openxmlformats.org/officeDocument/2006/relationships" xmlns:p="http://schemas.openxmlformats.org/presentationml/2006/main">
+  <p:cSld>
+    <p:spTree>
+      <p:nvGrpSpPr>
+        <p:cNvPr id="1" name=""/>
+        <p:cNvGrpSpPr/>
+        <p:nvPr/>
+      </p:nvGrpSpPr>
+      <p:grpSpPr>
+        <a:xfrm>
+          <a:off x="0" y="0"/>
+          <a:ext cx="0" cy="0"/>
+          <a:chOff x="0" y="0"/>
+          <a:chExt cx="0" cy="0"/>
+        </a:xfrm>
+      </p:grpSpPr>
+      <p:sp>
+        <p:nvSpPr>
+          <p:cNvPr id="4" name="Rectangle 3">
+            <a:extLst>
+              <a:ext uri="{FF2B5EF4-FFF2-40B4-BE49-F238E27FC236}">
+                <a16:creationId xmlns:a16="http://schemas.microsoft.com/office/drawing/2014/main" id="{B30018CE-34CF-4107-9366-FF25B8F52B8F}"/>
+              </a:ext>
+            </a:extLst>
+          </p:cNvPr>
+          <p:cNvSpPr/>
+          <p:nvPr/>
+        </p:nvSpPr>
+        <p:spPr>
+          <a:xfrm>
+            <a:off x="3810946" y="596346"/>
+            <a:ext cx="715617" cy="715617"/>
+          </a:xfrm>
+          <a:prstGeom prst="rect">
+            <a:avLst/>
+          </a:prstGeom>
+          <a:solidFill>
+            <a:srgbClr val="2476B3"/>
+          </a:solidFill>
+          <a:ln>
+            <a:noFill/>
+          </a:ln>
+        </p:spPr>
+        <p:style>
+          <a:lnRef idx="2">
+            <a:schemeClr val="accent1">
+              <a:shade val="50000"/>
+            </a:schemeClr>
+          </a:lnRef>
+          <a:fillRef idx="1">
+            <a:schemeClr val="accent1"/>
+          </a:fillRef>
+          <a:effectRef idx="0">
+            <a:schemeClr val="accent1"/>
+          </a:effectRef>
+          <a:fontRef idx="minor">
+            <a:schemeClr val="lt1"/>
+          </a:fontRef>
+        </p:style>
+        <p:txBody>
+          <a:bodyPr rtlCol="0" anchor="ctr"/>
+          <a:lstStyle/>
+          <a:p>
+            <a:pPr algn="ctr"/>
+            <a:endParaRPr lang="en-GB"/>
+          </a:p>
+        </p:txBody>
+      </p:sp>
+      <p:sp>
+        <p:nvSpPr>
+          <p:cNvPr id="5" name="Isosceles Triangle 4">
+            <a:extLst>
+              <a:ext uri="{FF2B5EF4-FFF2-40B4-BE49-F238E27FC236}">
+                <a16:creationId xmlns:a16="http://schemas.microsoft.com/office/drawing/2014/main" id="{64ED0CB6-CCDC-4595-BB4D-8D9A6FF86C5C}"/>
+              </a:ext>
+            </a:extLst>
+          </p:cNvPr>
+          <p:cNvSpPr/>
+          <p:nvPr/>
+        </p:nvSpPr>
+        <p:spPr>
+          <a:xfrm>
+            <a:off x="1664094" y="619066"/>
+            <a:ext cx="715617" cy="715617"/>
+          </a:xfrm>
+          <a:prstGeom prst="triangle">
+            <a:avLst/>
+          </a:prstGeom>
+          <a:solidFill>
+            <a:srgbClr val="2476B3"/>
+          </a:solidFill>
+          <a:ln>
+            <a:noFill/>
+          </a:ln>
+        </p:spPr>
+        <p:style>
+          <a:lnRef idx="2">
+            <a:schemeClr val="accent1">
+              <a:shade val="50000"/>
+            </a:schemeClr>
+          </a:lnRef>
+          <a:fillRef idx="1">
+            <a:schemeClr val="accent1"/>
+          </a:fillRef>
+          <a:effectRef idx="0">
+            <a:schemeClr val="accent1"/>
+          </a:effectRef>
+          <a:fontRef idx="minor">
+            <a:schemeClr val="lt1"/>
+          </a:fontRef>
+        </p:style>
+        <p:txBody>
+          <a:bodyPr rtlCol="0" anchor="ctr"/>
+          <a:lstStyle/>
+          <a:p>
+            <a:pPr algn="ctr"/>
+            <a:endParaRPr lang="en-GB"/>
+          </a:p>
+        </p:txBody>
+      </p:sp>
+      <p:sp>
+        <p:nvSpPr>
+          <p:cNvPr id="6" name="Oval 5">
+            <a:extLst>
+              <a:ext uri="{FF2B5EF4-FFF2-40B4-BE49-F238E27FC236}">
+                <a16:creationId xmlns:a16="http://schemas.microsoft.com/office/drawing/2014/main" id="{D56BB3B4-2BD3-421D-80D8-8BE8EC3B974E}"/>
+              </a:ext>
+            </a:extLst>
+          </p:cNvPr>
+          <p:cNvSpPr/>
+          <p:nvPr/>
+        </p:nvSpPr>
+        <p:spPr>
+          <a:xfrm>
+            <a:off x="2737520" y="619066"/>
+            <a:ext cx="715617" cy="715617"/>
+          </a:xfrm>
+          <a:prstGeom prst="ellipse">
+            <a:avLst/>
+          </a:prstGeom>
+          <a:solidFill>
+            <a:srgbClr val="2476B3"/>
+          </a:solidFill>
+          <a:ln>
+            <a:noFill/>
+          </a:ln>
+        </p:spPr>
+        <p:style>
+          <a:lnRef idx="2">
+            <a:schemeClr val="accent1">
+              <a:shade val="50000"/>
+            </a:schemeClr>
+          </a:lnRef>
+          <a:fillRef idx="1">
+            <a:schemeClr val="accent1"/>
+          </a:fillRef>
+          <a:effectRef idx="0">
+            <a:schemeClr val="accent1"/>
+          </a:effectRef>
+          <a:fontRef idx="minor">
+            <a:schemeClr val="lt1"/>
+          </a:fontRef>
+        </p:style>
+        <p:txBody>
+          <a:bodyPr rtlCol="0" anchor="ctr"/>
+          <a:lstStyle/>
+          <a:p>
+            <a:pPr algn="ctr"/>
+            <a:endParaRPr lang="en-GB"/>
+          </a:p>
+        </p:txBody>
+      </p:sp>
+      <p:sp>
+        <p:nvSpPr>
+          <p:cNvPr id="7" name="Cross 6">
+            <a:extLst>
+              <a:ext uri="{FF2B5EF4-FFF2-40B4-BE49-F238E27FC236}">
+                <a16:creationId xmlns:a16="http://schemas.microsoft.com/office/drawing/2014/main" id="{3606F514-499B-437E-8B3E-74AB59831A27}"/>
+              </a:ext>
+            </a:extLst>
+          </p:cNvPr>
+          <p:cNvSpPr/>
+          <p:nvPr/>
+        </p:nvSpPr>
+        <p:spPr>
+          <a:xfrm>
+            <a:off x="590668" y="619065"/>
+            <a:ext cx="715617" cy="715617"/>
+          </a:xfrm>
+          <a:prstGeom prst="plus">
+            <a:avLst/>
+          </a:prstGeom>
+          <a:solidFill>
+            <a:srgbClr val="2476B3"/>
+          </a:solidFill>
+          <a:ln>
+            <a:noFill/>
+          </a:ln>
+        </p:spPr>
+        <p:style>
+          <a:lnRef idx="2">
+            <a:schemeClr val="accent1">
+              <a:shade val="50000"/>
+            </a:schemeClr>
+          </a:lnRef>
+          <a:fillRef idx="1">
+            <a:schemeClr val="accent1"/>
+          </a:fillRef>
+          <a:effectRef idx="0">
+            <a:schemeClr val="accent1"/>
+          </a:effectRef>
+          <a:fontRef idx="minor">
+            <a:schemeClr val="lt1"/>
+          </a:fontRef>
+        </p:style>
+        <p:txBody>
+          <a:bodyPr rtlCol="0" anchor="ctr"/>
+          <a:lstStyle/>
+          <a:p>
+            <a:pPr algn="ctr"/>
+            <a:endParaRPr lang="en-GB"/>
+          </a:p>
+        </p:txBody>
+      </p:sp>
+      <p:sp>
+        <p:nvSpPr>
+          <p:cNvPr id="8" name="Star: 6 Points 7">
+            <a:extLst>
+              <a:ext uri="{FF2B5EF4-FFF2-40B4-BE49-F238E27FC236}">
+                <a16:creationId xmlns:a16="http://schemas.microsoft.com/office/drawing/2014/main" id="{1C889502-D6AD-4324-BC4E-ADE091DC1795}"/>
+              </a:ext>
+            </a:extLst>
+          </p:cNvPr>
+          <p:cNvSpPr/>
+          <p:nvPr/>
+        </p:nvSpPr>
+        <p:spPr>
+          <a:xfrm>
+            <a:off x="4884372" y="619066"/>
+            <a:ext cx="715617" cy="715617"/>
+          </a:xfrm>
+          <a:prstGeom prst="star6">
+            <a:avLst/>
+          </a:prstGeom>
+          <a:solidFill>
+            <a:srgbClr val="2476B3"/>
+          </a:solidFill>
+          <a:ln>
+            <a:noFill/>
+          </a:ln>
+        </p:spPr>
+        <p:style>
+          <a:lnRef idx="2">
+            <a:schemeClr val="accent1">
+              <a:shade val="50000"/>
+            </a:schemeClr>
+          </a:lnRef>
+          <a:fillRef idx="1">
+            <a:schemeClr val="accent1"/>
+          </a:fillRef>
+          <a:effectRef idx="0">
+            <a:schemeClr val="accent1"/>
+          </a:effectRef>
+          <a:fontRef idx="minor">
+            <a:schemeClr val="lt1"/>
+          </a:fontRef>
+        </p:style>
+        <p:txBody>
+          <a:bodyPr rtlCol="0" anchor="ctr"/>
+          <a:lstStyle/>
+          <a:p>
+            <a:pPr algn="ctr"/>
+            <a:endParaRPr lang="en-GB"/>
+          </a:p>
+        </p:txBody>
+      </p:sp>
+      <p:sp>
+        <p:nvSpPr>
+          <p:cNvPr id="9" name="Rectangle 8">
+            <a:extLst>
+              <a:ext uri="{FF2B5EF4-FFF2-40B4-BE49-F238E27FC236}">
+                <a16:creationId xmlns:a16="http://schemas.microsoft.com/office/drawing/2014/main" id="{7B2D6B22-5323-4F24-80F2-5D959B253955}"/>
+              </a:ext>
+            </a:extLst>
+          </p:cNvPr>
+          <p:cNvSpPr/>
+          <p:nvPr/>
+        </p:nvSpPr>
+        <p:spPr>
+          <a:xfrm>
+            <a:off x="590667" y="2532110"/>
+            <a:ext cx="715617" cy="715617"/>
+          </a:xfrm>
+          <a:prstGeom prst="rect">
+            <a:avLst/>
+          </a:prstGeom>
+          <a:solidFill>
+            <a:srgbClr val="2476B3"/>
+          </a:solidFill>
+          <a:ln>
+            <a:noFill/>
+          </a:ln>
+        </p:spPr>
+        <p:style>
+          <a:lnRef idx="2">
+            <a:schemeClr val="accent1">
+              <a:shade val="50000"/>
+            </a:schemeClr>
+          </a:lnRef>
+          <a:fillRef idx="1">
+            <a:schemeClr val="accent1"/>
+          </a:fillRef>
+          <a:effectRef idx="0">
+            <a:schemeClr val="accent1"/>
+          </a:effectRef>
+          <a:fontRef idx="minor">
+            <a:schemeClr val="lt1"/>
+          </a:fontRef>
+        </p:style>
+        <p:txBody>
+          <a:bodyPr rtlCol="0" anchor="ctr"/>
+          <a:lstStyle/>
+          <a:p>
+            <a:pPr algn="ctr"/>
+            <a:endParaRPr lang="en-GB"/>
+          </a:p>
+        </p:txBody>
+      </p:sp>
+      <p:sp>
+        <p:nvSpPr>
+          <p:cNvPr id="10" name="Rectangle 9">
+            <a:extLst>
+              <a:ext uri="{FF2B5EF4-FFF2-40B4-BE49-F238E27FC236}">
+                <a16:creationId xmlns:a16="http://schemas.microsoft.com/office/drawing/2014/main" id="{1DE25006-77CD-4B1C-BA52-180D82180747}"/>
+              </a:ext>
+            </a:extLst>
+          </p:cNvPr>
+          <p:cNvSpPr/>
+          <p:nvPr/>
+        </p:nvSpPr>
+        <p:spPr>
+          <a:xfrm>
+            <a:off x="1664093" y="2532110"/>
+            <a:ext cx="715617" cy="715617"/>
+          </a:xfrm>
+          <a:prstGeom prst="rect">
+            <a:avLst/>
+          </a:prstGeom>
+          <a:solidFill>
+            <a:srgbClr val="FF7E16"/>
+          </a:solidFill>
+          <a:ln>
+            <a:noFill/>
+          </a:ln>
+        </p:spPr>
+        <p:style>
+          <a:lnRef idx="2">
+            <a:schemeClr val="accent1">
+              <a:shade val="50000"/>
+            </a:schemeClr>
+          </a:lnRef>
+          <a:fillRef idx="1">
+            <a:schemeClr val="accent1"/>
+          </a:fillRef>
+          <a:effectRef idx="0">
+            <a:schemeClr val="accent1"/>
+          </a:effectRef>
+          <a:fontRef idx="minor">
+            <a:schemeClr val="lt1"/>
+          </a:fontRef>
+        </p:style>
+        <p:txBody>
+          <a:bodyPr rtlCol="0" anchor="ctr"/>
+          <a:lstStyle/>
+          <a:p>
+            <a:pPr algn="ctr"/>
+            <a:endParaRPr lang="en-GB"/>
+          </a:p>
+        </p:txBody>
+      </p:sp>
+      <p:sp>
+        <p:nvSpPr>
+          <p:cNvPr id="11" name="Rectangle 10">
+            <a:extLst>
+              <a:ext uri="{FF2B5EF4-FFF2-40B4-BE49-F238E27FC236}">
+                <a16:creationId xmlns:a16="http://schemas.microsoft.com/office/drawing/2014/main" id="{A36E6B9A-752F-47C0-9AE1-8E0488F5D724}"/>
+              </a:ext>
+            </a:extLst>
+          </p:cNvPr>
+          <p:cNvSpPr/>
+          <p:nvPr/>
+        </p:nvSpPr>
+        <p:spPr>
+          <a:xfrm>
+            <a:off x="2737519" y="2532110"/>
+            <a:ext cx="715617" cy="715617"/>
+          </a:xfrm>
+          <a:prstGeom prst="rect">
+            <a:avLst/>
+          </a:prstGeom>
+          <a:solidFill>
+            <a:srgbClr val="309F30"/>
+          </a:solidFill>
+          <a:ln>
+            <a:noFill/>
+          </a:ln>
+        </p:spPr>
+        <p:style>
+          <a:lnRef idx="2">
+            <a:schemeClr val="accent1">
+              <a:shade val="50000"/>
+            </a:schemeClr>
+          </a:lnRef>
+          <a:fillRef idx="1">
+            <a:schemeClr val="accent1"/>
+          </a:fillRef>
+          <a:effectRef idx="0">
+            <a:schemeClr val="accent1"/>
+          </a:effectRef>
+          <a:fontRef idx="minor">
+            <a:schemeClr val="lt1"/>
+          </a:fontRef>
+        </p:style>
+        <p:txBody>
+          <a:bodyPr rtlCol="0" anchor="ctr"/>
+          <a:lstStyle/>
+          <a:p>
+            <a:pPr algn="ctr"/>
+            <a:endParaRPr lang="en-GB"/>
+          </a:p>
+        </p:txBody>
+      </p:sp>
+      <p:sp>
+        <p:nvSpPr>
+          <p:cNvPr id="12" name="Rectangle 11">
+            <a:extLst>
+              <a:ext uri="{FF2B5EF4-FFF2-40B4-BE49-F238E27FC236}">
+                <a16:creationId xmlns:a16="http://schemas.microsoft.com/office/drawing/2014/main" id="{84BBCB9D-92A8-4C9F-B529-D356449906FC}"/>
+              </a:ext>
+            </a:extLst>
+          </p:cNvPr>
+          <p:cNvSpPr/>
+          <p:nvPr/>
+        </p:nvSpPr>
+        <p:spPr>
+          <a:xfrm>
+            <a:off x="3810945" y="2532110"/>
+            <a:ext cx="715617" cy="715617"/>
+          </a:xfrm>
+          <a:prstGeom prst="rect">
+            <a:avLst/>
+          </a:prstGeom>
+          <a:solidFill>
+            <a:srgbClr val="D52B2C"/>
+          </a:solidFill>
+          <a:ln>
+            <a:noFill/>
+          </a:ln>
+        </p:spPr>
+        <p:style>
+          <a:lnRef idx="2">
+            <a:schemeClr val="accent1">
+              <a:shade val="50000"/>
+            </a:schemeClr>
+          </a:lnRef>
+          <a:fillRef idx="1">
+            <a:schemeClr val="accent1"/>
+          </a:fillRef>
+          <a:effectRef idx="0">
+            <a:schemeClr val="accent1"/>
+          </a:effectRef>
+          <a:fontRef idx="minor">
+            <a:schemeClr val="lt1"/>
+          </a:fontRef>
+        </p:style>
+        <p:txBody>
+          <a:bodyPr rtlCol="0" anchor="ctr"/>
+          <a:lstStyle/>
+          <a:p>
+            <a:pPr algn="ctr"/>
+            <a:endParaRPr lang="en-GB"/>
+          </a:p>
+        </p:txBody>
+      </p:sp>
+      <p:sp>
+        <p:nvSpPr>
+          <p:cNvPr id="13" name="Rectangle 12">
+            <a:extLst>
+              <a:ext uri="{FF2B5EF4-FFF2-40B4-BE49-F238E27FC236}">
+                <a16:creationId xmlns:a16="http://schemas.microsoft.com/office/drawing/2014/main" id="{0588B822-A9DC-42E6-9F92-8B12A7EC09ED}"/>
+              </a:ext>
+            </a:extLst>
+          </p:cNvPr>
+          <p:cNvSpPr/>
+          <p:nvPr/>
+        </p:nvSpPr>
+        <p:spPr>
+          <a:xfrm>
+            <a:off x="4884372" y="2532109"/>
+            <a:ext cx="715617" cy="715617"/>
+          </a:xfrm>
+          <a:prstGeom prst="rect">
+            <a:avLst/>
+          </a:prstGeom>
+          <a:solidFill>
+            <a:srgbClr val="9367BC"/>
+          </a:solidFill>
+          <a:ln>
+            <a:noFill/>
+          </a:ln>
+        </p:spPr>
+        <p:style>
+          <a:lnRef idx="2">
+            <a:schemeClr val="accent1">
+              <a:shade val="50000"/>
+            </a:schemeClr>
+          </a:lnRef>
+          <a:fillRef idx="1">
+            <a:schemeClr val="accent1"/>
+          </a:fillRef>
+          <a:effectRef idx="0">
+            <a:schemeClr val="accent1"/>
+          </a:effectRef>
+          <a:fontRef idx="minor">
+            <a:schemeClr val="lt1"/>
+          </a:fontRef>
+        </p:style>
+        <p:txBody>
+          <a:bodyPr rtlCol="0" anchor="ctr"/>
+          <a:lstStyle/>
+          <a:p>
+            <a:pPr algn="ctr"/>
+            <a:endParaRPr lang="en-GB"/>
+          </a:p>
+        </p:txBody>
+      </p:sp>
+    </p:spTree>
+    <p:extLst>
+      <p:ext uri="{BB962C8B-B14F-4D97-AF65-F5344CB8AC3E}">
+        <p14:creationId xmlns:p14="http://schemas.microsoft.com/office/powerpoint/2010/main" val="3601331513"/>
+      </p:ext>
+    </p:extLst>
+  </p:cSld>
+  <p:clrMapOvr>
+    <a:masterClrMapping/>
+  </p:clrMapOvr>
+</p:sld>
+</file>
+
 <file path=ppt/theme/theme1.xml><?xml version="1.0" encoding="utf-8"?>
 <a:theme xmlns:a="http://schemas.openxmlformats.org/drawingml/2006/main" name="Office Theme">
   <a:themeElements>

</xml_diff>

<commit_message>
Adding lecture on models
</commit_message>
<xml_diff>
--- a/human-computer-interaction/slides/diagrams.pptx
+++ b/human-computer-interaction/slides/diagrams.pptx
@@ -7,6 +7,11 @@
   <p:sldIdLst>
     <p:sldId id="256" r:id="rId2"/>
     <p:sldId id="257" r:id="rId3"/>
+    <p:sldId id="258" r:id="rId4"/>
+    <p:sldId id="260" r:id="rId5"/>
+    <p:sldId id="259" r:id="rId6"/>
+    <p:sldId id="261" r:id="rId7"/>
+    <p:sldId id="262" r:id="rId8"/>
   </p:sldIdLst>
   <p:sldSz cx="12192000" cy="6858000"/>
   <p:notesSz cx="6858000" cy="9144000"/>
@@ -113,6 +118,18 @@
 </p:presentation>
 </file>
 
+<file path=ppt/commentAuthors.xml><?xml version="1.0" encoding="utf-8"?>
+<p:cmAuthorLst xmlns:a="http://schemas.openxmlformats.org/drawingml/2006/main" xmlns:r="http://schemas.openxmlformats.org/officeDocument/2006/relationships" xmlns:p="http://schemas.openxmlformats.org/presentationml/2006/main">
+  <p:cmAuthor id="1" name="Tomas Petricek" initials="TP" lastIdx="1" clrIdx="0">
+    <p:extLst>
+      <p:ext uri="{19B8F6BF-5375-455C-9EA6-DF929625EA0E}">
+        <p15:presenceInfo xmlns:p15="http://schemas.microsoft.com/office/powerpoint/2012/main" userId="6ddff5260c96e30a" providerId="Windows Live"/>
+      </p:ext>
+    </p:extLst>
+  </p:cmAuthor>
+</p:cmAuthorLst>
+</file>
+
 <file path=ppt/slideLayouts/slideLayout1.xml><?xml version="1.0" encoding="utf-8"?>
 <p:sldLayout xmlns:a="http://schemas.openxmlformats.org/drawingml/2006/main" xmlns:r="http://schemas.openxmlformats.org/officeDocument/2006/relationships" xmlns:p="http://schemas.openxmlformats.org/presentationml/2006/main" type="title" preserve="1">
   <p:cSld name="Title Slide">
@@ -262,7 +279,7 @@
           <a:p>
             <a:fld id="{9A568872-756E-4185-AFB0-F4ACC864CE89}" type="datetimeFigureOut">
               <a:rPr lang="en-GB" smtClean="0"/>
-              <a:t>13/10/2018</a:t>
+              <a:t>24/10/2018</a:t>
             </a:fld>
             <a:endParaRPr lang="en-GB"/>
           </a:p>
@@ -462,7 +479,7 @@
           <a:p>
             <a:fld id="{9A568872-756E-4185-AFB0-F4ACC864CE89}" type="datetimeFigureOut">
               <a:rPr lang="en-GB" smtClean="0"/>
-              <a:t>13/10/2018</a:t>
+              <a:t>24/10/2018</a:t>
             </a:fld>
             <a:endParaRPr lang="en-GB"/>
           </a:p>
@@ -672,7 +689,7 @@
           <a:p>
             <a:fld id="{9A568872-756E-4185-AFB0-F4ACC864CE89}" type="datetimeFigureOut">
               <a:rPr lang="en-GB" smtClean="0"/>
-              <a:t>13/10/2018</a:t>
+              <a:t>24/10/2018</a:t>
             </a:fld>
             <a:endParaRPr lang="en-GB"/>
           </a:p>
@@ -872,7 +889,7 @@
           <a:p>
             <a:fld id="{9A568872-756E-4185-AFB0-F4ACC864CE89}" type="datetimeFigureOut">
               <a:rPr lang="en-GB" smtClean="0"/>
-              <a:t>13/10/2018</a:t>
+              <a:t>24/10/2018</a:t>
             </a:fld>
             <a:endParaRPr lang="en-GB"/>
           </a:p>
@@ -1148,7 +1165,7 @@
           <a:p>
             <a:fld id="{9A568872-756E-4185-AFB0-F4ACC864CE89}" type="datetimeFigureOut">
               <a:rPr lang="en-GB" smtClean="0"/>
-              <a:t>13/10/2018</a:t>
+              <a:t>24/10/2018</a:t>
             </a:fld>
             <a:endParaRPr lang="en-GB"/>
           </a:p>
@@ -1416,7 +1433,7 @@
           <a:p>
             <a:fld id="{9A568872-756E-4185-AFB0-F4ACC864CE89}" type="datetimeFigureOut">
               <a:rPr lang="en-GB" smtClean="0"/>
-              <a:t>13/10/2018</a:t>
+              <a:t>24/10/2018</a:t>
             </a:fld>
             <a:endParaRPr lang="en-GB"/>
           </a:p>
@@ -1831,7 +1848,7 @@
           <a:p>
             <a:fld id="{9A568872-756E-4185-AFB0-F4ACC864CE89}" type="datetimeFigureOut">
               <a:rPr lang="en-GB" smtClean="0"/>
-              <a:t>13/10/2018</a:t>
+              <a:t>24/10/2018</a:t>
             </a:fld>
             <a:endParaRPr lang="en-GB"/>
           </a:p>
@@ -1973,7 +1990,7 @@
           <a:p>
             <a:fld id="{9A568872-756E-4185-AFB0-F4ACC864CE89}" type="datetimeFigureOut">
               <a:rPr lang="en-GB" smtClean="0"/>
-              <a:t>13/10/2018</a:t>
+              <a:t>24/10/2018</a:t>
             </a:fld>
             <a:endParaRPr lang="en-GB"/>
           </a:p>
@@ -2086,7 +2103,7 @@
           <a:p>
             <a:fld id="{9A568872-756E-4185-AFB0-F4ACC864CE89}" type="datetimeFigureOut">
               <a:rPr lang="en-GB" smtClean="0"/>
-              <a:t>13/10/2018</a:t>
+              <a:t>24/10/2018</a:t>
             </a:fld>
             <a:endParaRPr lang="en-GB"/>
           </a:p>
@@ -2399,7 +2416,7 @@
           <a:p>
             <a:fld id="{9A568872-756E-4185-AFB0-F4ACC864CE89}" type="datetimeFigureOut">
               <a:rPr lang="en-GB" smtClean="0"/>
-              <a:t>13/10/2018</a:t>
+              <a:t>24/10/2018</a:t>
             </a:fld>
             <a:endParaRPr lang="en-GB"/>
           </a:p>
@@ -2688,7 +2705,7 @@
           <a:p>
             <a:fld id="{9A568872-756E-4185-AFB0-F4ACC864CE89}" type="datetimeFigureOut">
               <a:rPr lang="en-GB" smtClean="0"/>
-              <a:t>13/10/2018</a:t>
+              <a:t>24/10/2018</a:t>
             </a:fld>
             <a:endParaRPr lang="en-GB"/>
           </a:p>
@@ -2931,7 +2948,7 @@
           <a:p>
             <a:fld id="{9A568872-756E-4185-AFB0-F4ACC864CE89}" type="datetimeFigureOut">
               <a:rPr lang="en-GB" smtClean="0"/>
-              <a:t>13/10/2018</a:t>
+              <a:t>24/10/2018</a:t>
             </a:fld>
             <a:endParaRPr lang="en-GB"/>
           </a:p>
@@ -4499,6 +4516,1974 @@
 </p:sld>
 </file>
 
+<file path=ppt/slides/slide3.xml><?xml version="1.0" encoding="utf-8"?>
+<p:sld xmlns:a="http://schemas.openxmlformats.org/drawingml/2006/main" xmlns:r="http://schemas.openxmlformats.org/officeDocument/2006/relationships" xmlns:p="http://schemas.openxmlformats.org/presentationml/2006/main">
+  <p:cSld>
+    <p:spTree>
+      <p:nvGrpSpPr>
+        <p:cNvPr id="1" name=""/>
+        <p:cNvGrpSpPr/>
+        <p:nvPr/>
+      </p:nvGrpSpPr>
+      <p:grpSpPr>
+        <a:xfrm>
+          <a:off x="0" y="0"/>
+          <a:ext cx="0" cy="0"/>
+          <a:chOff x="0" y="0"/>
+          <a:chExt cx="0" cy="0"/>
+        </a:xfrm>
+      </p:grpSpPr>
+      <p:sp>
+        <p:nvSpPr>
+          <p:cNvPr id="7" name="Rectangle 6">
+            <a:extLst>
+              <a:ext uri="{FF2B5EF4-FFF2-40B4-BE49-F238E27FC236}">
+                <a16:creationId xmlns:a16="http://schemas.microsoft.com/office/drawing/2014/main" id="{858D8AC8-9DD0-4CBF-83B9-CB7CDF924A62}"/>
+              </a:ext>
+            </a:extLst>
+          </p:cNvPr>
+          <p:cNvSpPr/>
+          <p:nvPr/>
+        </p:nvSpPr>
+        <p:spPr>
+          <a:xfrm>
+            <a:off x="2726288" y="1919550"/>
+            <a:ext cx="568939" cy="2838193"/>
+          </a:xfrm>
+          <a:prstGeom prst="rect">
+            <a:avLst/>
+          </a:prstGeom>
+          <a:solidFill>
+            <a:schemeClr val="accent4">
+              <a:alpha val="60000"/>
+            </a:schemeClr>
+          </a:solidFill>
+          <a:ln>
+            <a:noFill/>
+          </a:ln>
+        </p:spPr>
+        <p:style>
+          <a:lnRef idx="2">
+            <a:schemeClr val="accent1">
+              <a:shade val="50000"/>
+            </a:schemeClr>
+          </a:lnRef>
+          <a:fillRef idx="1">
+            <a:schemeClr val="accent1"/>
+          </a:fillRef>
+          <a:effectRef idx="0">
+            <a:schemeClr val="accent1"/>
+          </a:effectRef>
+          <a:fontRef idx="minor">
+            <a:schemeClr val="lt1"/>
+          </a:fontRef>
+        </p:style>
+        <p:txBody>
+          <a:bodyPr rtlCol="0" anchor="ctr"/>
+          <a:lstStyle/>
+          <a:p>
+            <a:pPr algn="ctr"/>
+            <a:endParaRPr lang="en-GB"/>
+          </a:p>
+        </p:txBody>
+      </p:sp>
+      <p:sp>
+        <p:nvSpPr>
+          <p:cNvPr id="8" name="Rectangle 7">
+            <a:extLst>
+              <a:ext uri="{FF2B5EF4-FFF2-40B4-BE49-F238E27FC236}">
+                <a16:creationId xmlns:a16="http://schemas.microsoft.com/office/drawing/2014/main" id="{BAA6F75F-394A-41D9-84D9-3E007D09EB77}"/>
+              </a:ext>
+            </a:extLst>
+          </p:cNvPr>
+          <p:cNvSpPr/>
+          <p:nvPr/>
+        </p:nvSpPr>
+        <p:spPr>
+          <a:xfrm>
+            <a:off x="3847275" y="1919549"/>
+            <a:ext cx="568939" cy="2838193"/>
+          </a:xfrm>
+          <a:prstGeom prst="rect">
+            <a:avLst/>
+          </a:prstGeom>
+          <a:solidFill>
+            <a:schemeClr val="accent4">
+              <a:alpha val="60000"/>
+            </a:schemeClr>
+          </a:solidFill>
+          <a:ln>
+            <a:noFill/>
+          </a:ln>
+        </p:spPr>
+        <p:style>
+          <a:lnRef idx="2">
+            <a:schemeClr val="accent1">
+              <a:shade val="50000"/>
+            </a:schemeClr>
+          </a:lnRef>
+          <a:fillRef idx="1">
+            <a:schemeClr val="accent1"/>
+          </a:fillRef>
+          <a:effectRef idx="0">
+            <a:schemeClr val="accent1"/>
+          </a:effectRef>
+          <a:fontRef idx="minor">
+            <a:schemeClr val="lt1"/>
+          </a:fontRef>
+        </p:style>
+        <p:txBody>
+          <a:bodyPr rtlCol="0" anchor="ctr"/>
+          <a:lstStyle/>
+          <a:p>
+            <a:pPr algn="ctr"/>
+            <a:endParaRPr lang="en-GB"/>
+          </a:p>
+        </p:txBody>
+      </p:sp>
+      <p:sp>
+        <p:nvSpPr>
+          <p:cNvPr id="9" name="Rectangle 8">
+            <a:extLst>
+              <a:ext uri="{FF2B5EF4-FFF2-40B4-BE49-F238E27FC236}">
+                <a16:creationId xmlns:a16="http://schemas.microsoft.com/office/drawing/2014/main" id="{FBD7D761-01BD-4E49-A2C9-30FBB54486BE}"/>
+              </a:ext>
+            </a:extLst>
+          </p:cNvPr>
+          <p:cNvSpPr/>
+          <p:nvPr/>
+        </p:nvSpPr>
+        <p:spPr>
+          <a:xfrm>
+            <a:off x="4968262" y="1919549"/>
+            <a:ext cx="568939" cy="2838193"/>
+          </a:xfrm>
+          <a:prstGeom prst="rect">
+            <a:avLst/>
+          </a:prstGeom>
+          <a:solidFill>
+            <a:schemeClr val="accent4">
+              <a:alpha val="60000"/>
+            </a:schemeClr>
+          </a:solidFill>
+          <a:ln>
+            <a:noFill/>
+          </a:ln>
+        </p:spPr>
+        <p:style>
+          <a:lnRef idx="2">
+            <a:schemeClr val="accent1">
+              <a:shade val="50000"/>
+            </a:schemeClr>
+          </a:lnRef>
+          <a:fillRef idx="1">
+            <a:schemeClr val="accent1"/>
+          </a:fillRef>
+          <a:effectRef idx="0">
+            <a:schemeClr val="accent1"/>
+          </a:effectRef>
+          <a:fontRef idx="minor">
+            <a:schemeClr val="lt1"/>
+          </a:fontRef>
+        </p:style>
+        <p:txBody>
+          <a:bodyPr rtlCol="0" anchor="ctr"/>
+          <a:lstStyle/>
+          <a:p>
+            <a:pPr algn="ctr"/>
+            <a:endParaRPr lang="en-GB"/>
+          </a:p>
+        </p:txBody>
+      </p:sp>
+      <p:sp>
+        <p:nvSpPr>
+          <p:cNvPr id="10" name="Rectangle 9">
+            <a:extLst>
+              <a:ext uri="{FF2B5EF4-FFF2-40B4-BE49-F238E27FC236}">
+                <a16:creationId xmlns:a16="http://schemas.microsoft.com/office/drawing/2014/main" id="{F964F427-484F-4352-B0BF-D70C1AC5BA0D}"/>
+              </a:ext>
+            </a:extLst>
+          </p:cNvPr>
+          <p:cNvSpPr/>
+          <p:nvPr/>
+        </p:nvSpPr>
+        <p:spPr>
+          <a:xfrm>
+            <a:off x="6085862" y="1919549"/>
+            <a:ext cx="568939" cy="2838193"/>
+          </a:xfrm>
+          <a:prstGeom prst="rect">
+            <a:avLst/>
+          </a:prstGeom>
+          <a:solidFill>
+            <a:schemeClr val="accent4">
+              <a:alpha val="60000"/>
+            </a:schemeClr>
+          </a:solidFill>
+          <a:ln>
+            <a:noFill/>
+          </a:ln>
+        </p:spPr>
+        <p:style>
+          <a:lnRef idx="2">
+            <a:schemeClr val="accent1">
+              <a:shade val="50000"/>
+            </a:schemeClr>
+          </a:lnRef>
+          <a:fillRef idx="1">
+            <a:schemeClr val="accent1"/>
+          </a:fillRef>
+          <a:effectRef idx="0">
+            <a:schemeClr val="accent1"/>
+          </a:effectRef>
+          <a:fontRef idx="minor">
+            <a:schemeClr val="lt1"/>
+          </a:fontRef>
+        </p:style>
+        <p:txBody>
+          <a:bodyPr rtlCol="0" anchor="ctr"/>
+          <a:lstStyle/>
+          <a:p>
+            <a:pPr algn="ctr"/>
+            <a:endParaRPr lang="en-GB"/>
+          </a:p>
+        </p:txBody>
+      </p:sp>
+      <p:sp>
+        <p:nvSpPr>
+          <p:cNvPr id="11" name="Rectangle 10">
+            <a:extLst>
+              <a:ext uri="{FF2B5EF4-FFF2-40B4-BE49-F238E27FC236}">
+                <a16:creationId xmlns:a16="http://schemas.microsoft.com/office/drawing/2014/main" id="{01721A0D-2B6B-40AB-B77C-9642D8273825}"/>
+              </a:ext>
+            </a:extLst>
+          </p:cNvPr>
+          <p:cNvSpPr/>
+          <p:nvPr/>
+        </p:nvSpPr>
+        <p:spPr>
+          <a:xfrm>
+            <a:off x="7203462" y="1903140"/>
+            <a:ext cx="568939" cy="2838193"/>
+          </a:xfrm>
+          <a:prstGeom prst="rect">
+            <a:avLst/>
+          </a:prstGeom>
+          <a:solidFill>
+            <a:schemeClr val="accent4">
+              <a:alpha val="60000"/>
+            </a:schemeClr>
+          </a:solidFill>
+          <a:ln>
+            <a:noFill/>
+          </a:ln>
+        </p:spPr>
+        <p:style>
+          <a:lnRef idx="2">
+            <a:schemeClr val="accent1">
+              <a:shade val="50000"/>
+            </a:schemeClr>
+          </a:lnRef>
+          <a:fillRef idx="1">
+            <a:schemeClr val="accent1"/>
+          </a:fillRef>
+          <a:effectRef idx="0">
+            <a:schemeClr val="accent1"/>
+          </a:effectRef>
+          <a:fontRef idx="minor">
+            <a:schemeClr val="lt1"/>
+          </a:fontRef>
+        </p:style>
+        <p:txBody>
+          <a:bodyPr rtlCol="0" anchor="ctr"/>
+          <a:lstStyle/>
+          <a:p>
+            <a:pPr algn="ctr"/>
+            <a:endParaRPr lang="en-GB"/>
+          </a:p>
+        </p:txBody>
+      </p:sp>
+      <p:sp>
+        <p:nvSpPr>
+          <p:cNvPr id="12" name="Rectangle 11">
+            <a:extLst>
+              <a:ext uri="{FF2B5EF4-FFF2-40B4-BE49-F238E27FC236}">
+                <a16:creationId xmlns:a16="http://schemas.microsoft.com/office/drawing/2014/main" id="{46D59E1A-3147-47CB-A17F-90CFB4E7F452}"/>
+              </a:ext>
+            </a:extLst>
+          </p:cNvPr>
+          <p:cNvSpPr/>
+          <p:nvPr/>
+        </p:nvSpPr>
+        <p:spPr>
+          <a:xfrm>
+            <a:off x="8321062" y="1919548"/>
+            <a:ext cx="568939" cy="2838193"/>
+          </a:xfrm>
+          <a:prstGeom prst="rect">
+            <a:avLst/>
+          </a:prstGeom>
+          <a:solidFill>
+            <a:schemeClr val="accent4">
+              <a:alpha val="60000"/>
+            </a:schemeClr>
+          </a:solidFill>
+          <a:ln>
+            <a:noFill/>
+          </a:ln>
+        </p:spPr>
+        <p:style>
+          <a:lnRef idx="2">
+            <a:schemeClr val="accent1">
+              <a:shade val="50000"/>
+            </a:schemeClr>
+          </a:lnRef>
+          <a:fillRef idx="1">
+            <a:schemeClr val="accent1"/>
+          </a:fillRef>
+          <a:effectRef idx="0">
+            <a:schemeClr val="accent1"/>
+          </a:effectRef>
+          <a:fontRef idx="minor">
+            <a:schemeClr val="lt1"/>
+          </a:fontRef>
+        </p:style>
+        <p:txBody>
+          <a:bodyPr rtlCol="0" anchor="ctr"/>
+          <a:lstStyle/>
+          <a:p>
+            <a:pPr algn="ctr"/>
+            <a:endParaRPr lang="en-GB"/>
+          </a:p>
+        </p:txBody>
+      </p:sp>
+      <p:sp>
+        <p:nvSpPr>
+          <p:cNvPr id="5" name="Rectangle 4">
+            <a:extLst>
+              <a:ext uri="{FF2B5EF4-FFF2-40B4-BE49-F238E27FC236}">
+                <a16:creationId xmlns:a16="http://schemas.microsoft.com/office/drawing/2014/main" id="{CD03F107-D68A-47F5-B257-B9EC3B3CC17B}"/>
+              </a:ext>
+            </a:extLst>
+          </p:cNvPr>
+          <p:cNvSpPr/>
+          <p:nvPr/>
+        </p:nvSpPr>
+        <p:spPr>
+          <a:xfrm>
+            <a:off x="2726288" y="3322237"/>
+            <a:ext cx="6675098" cy="562271"/>
+          </a:xfrm>
+          <a:prstGeom prst="rect">
+            <a:avLst/>
+          </a:prstGeom>
+          <a:solidFill>
+            <a:schemeClr val="accent1">
+              <a:alpha val="50000"/>
+            </a:schemeClr>
+          </a:solidFill>
+          <a:ln>
+            <a:noFill/>
+          </a:ln>
+        </p:spPr>
+        <p:style>
+          <a:lnRef idx="2">
+            <a:schemeClr val="accent1">
+              <a:shade val="50000"/>
+            </a:schemeClr>
+          </a:lnRef>
+          <a:fillRef idx="1">
+            <a:schemeClr val="accent1"/>
+          </a:fillRef>
+          <a:effectRef idx="0">
+            <a:schemeClr val="accent1"/>
+          </a:effectRef>
+          <a:fontRef idx="minor">
+            <a:schemeClr val="lt1"/>
+          </a:fontRef>
+        </p:style>
+        <p:txBody>
+          <a:bodyPr rtlCol="0" anchor="ctr"/>
+          <a:lstStyle/>
+          <a:p>
+            <a:pPr algn="ctr"/>
+            <a:endParaRPr lang="en-GB"/>
+          </a:p>
+        </p:txBody>
+      </p:sp>
+      <p:sp>
+        <p:nvSpPr>
+          <p:cNvPr id="4" name="Rectangle 3">
+            <a:extLst>
+              <a:ext uri="{FF2B5EF4-FFF2-40B4-BE49-F238E27FC236}">
+                <a16:creationId xmlns:a16="http://schemas.microsoft.com/office/drawing/2014/main" id="{DE4470E8-D52A-42A0-8077-0446137F16B8}"/>
+              </a:ext>
+            </a:extLst>
+          </p:cNvPr>
+          <p:cNvSpPr/>
+          <p:nvPr/>
+        </p:nvSpPr>
+        <p:spPr>
+          <a:xfrm>
+            <a:off x="2726287" y="2449002"/>
+            <a:ext cx="6675099" cy="562271"/>
+          </a:xfrm>
+          <a:prstGeom prst="rect">
+            <a:avLst/>
+          </a:prstGeom>
+          <a:solidFill>
+            <a:schemeClr val="accent1">
+              <a:alpha val="50000"/>
+            </a:schemeClr>
+          </a:solidFill>
+          <a:ln>
+            <a:noFill/>
+          </a:ln>
+        </p:spPr>
+        <p:style>
+          <a:lnRef idx="2">
+            <a:schemeClr val="accent1">
+              <a:shade val="50000"/>
+            </a:schemeClr>
+          </a:lnRef>
+          <a:fillRef idx="1">
+            <a:schemeClr val="accent1"/>
+          </a:fillRef>
+          <a:effectRef idx="0">
+            <a:schemeClr val="accent1"/>
+          </a:effectRef>
+          <a:fontRef idx="minor">
+            <a:schemeClr val="lt1"/>
+          </a:fontRef>
+        </p:style>
+        <p:txBody>
+          <a:bodyPr rtlCol="0" anchor="ctr"/>
+          <a:lstStyle/>
+          <a:p>
+            <a:pPr algn="ctr"/>
+            <a:endParaRPr lang="en-GB"/>
+          </a:p>
+        </p:txBody>
+      </p:sp>
+      <p:sp>
+        <p:nvSpPr>
+          <p:cNvPr id="6" name="Rectangle 5">
+            <a:extLst>
+              <a:ext uri="{FF2B5EF4-FFF2-40B4-BE49-F238E27FC236}">
+                <a16:creationId xmlns:a16="http://schemas.microsoft.com/office/drawing/2014/main" id="{F647E393-B4B4-4B88-ABAF-9DE78910C812}"/>
+              </a:ext>
+            </a:extLst>
+          </p:cNvPr>
+          <p:cNvSpPr/>
+          <p:nvPr/>
+        </p:nvSpPr>
+        <p:spPr>
+          <a:xfrm>
+            <a:off x="2726288" y="4195472"/>
+            <a:ext cx="6675098" cy="562271"/>
+          </a:xfrm>
+          <a:prstGeom prst="rect">
+            <a:avLst/>
+          </a:prstGeom>
+          <a:solidFill>
+            <a:schemeClr val="accent1">
+              <a:alpha val="50000"/>
+            </a:schemeClr>
+          </a:solidFill>
+          <a:ln>
+            <a:noFill/>
+          </a:ln>
+        </p:spPr>
+        <p:style>
+          <a:lnRef idx="2">
+            <a:schemeClr val="accent1">
+              <a:shade val="50000"/>
+            </a:schemeClr>
+          </a:lnRef>
+          <a:fillRef idx="1">
+            <a:schemeClr val="accent1"/>
+          </a:fillRef>
+          <a:effectRef idx="0">
+            <a:schemeClr val="accent1"/>
+          </a:effectRef>
+          <a:fontRef idx="minor">
+            <a:schemeClr val="lt1"/>
+          </a:fontRef>
+        </p:style>
+        <p:txBody>
+          <a:bodyPr rtlCol="0" anchor="ctr"/>
+          <a:lstStyle/>
+          <a:p>
+            <a:pPr algn="ctr"/>
+            <a:endParaRPr lang="en-GB"/>
+          </a:p>
+        </p:txBody>
+      </p:sp>
+      <p:sp>
+        <p:nvSpPr>
+          <p:cNvPr id="13" name="TextBox 12">
+            <a:extLst>
+              <a:ext uri="{FF2B5EF4-FFF2-40B4-BE49-F238E27FC236}">
+                <a16:creationId xmlns:a16="http://schemas.microsoft.com/office/drawing/2014/main" id="{C6260498-ECD6-4222-BCC8-53116580F4E8}"/>
+              </a:ext>
+            </a:extLst>
+          </p:cNvPr>
+          <p:cNvSpPr txBox="1"/>
+          <p:nvPr/>
+        </p:nvSpPr>
+        <p:spPr>
+          <a:xfrm>
+            <a:off x="2726286" y="5005493"/>
+            <a:ext cx="6675099" cy="430887"/>
+          </a:xfrm>
+          <a:prstGeom prst="rect">
+            <a:avLst/>
+          </a:prstGeom>
+          <a:noFill/>
+        </p:spPr>
+        <p:txBody>
+          <a:bodyPr wrap="square" rtlCol="0">
+            <a:spAutoFit/>
+          </a:bodyPr>
+          <a:lstStyle/>
+          <a:p>
+            <a:r>
+              <a:rPr lang="en-US" sz="2200" b="1" dirty="0">
+                <a:solidFill>
+                  <a:schemeClr val="accent4">
+                    <a:lumMod val="75000"/>
+                  </a:schemeClr>
+                </a:solidFill>
+              </a:rPr>
+              <a:t>COGNITIVE DIMENSIONS</a:t>
+            </a:r>
+            <a:endParaRPr lang="en-GB" sz="2200" b="1" dirty="0">
+              <a:solidFill>
+                <a:schemeClr val="accent4">
+                  <a:lumMod val="75000"/>
+                </a:schemeClr>
+              </a:solidFill>
+            </a:endParaRPr>
+          </a:p>
+        </p:txBody>
+      </p:sp>
+      <p:sp>
+        <p:nvSpPr>
+          <p:cNvPr id="14" name="TextBox 13">
+            <a:extLst>
+              <a:ext uri="{FF2B5EF4-FFF2-40B4-BE49-F238E27FC236}">
+                <a16:creationId xmlns:a16="http://schemas.microsoft.com/office/drawing/2014/main" id="{A3A6A19B-D338-48EF-BBEC-6A23B4A88AD2}"/>
+              </a:ext>
+            </a:extLst>
+          </p:cNvPr>
+          <p:cNvSpPr txBox="1"/>
+          <p:nvPr/>
+        </p:nvSpPr>
+        <p:spPr>
+          <a:xfrm rot="16200000">
+            <a:off x="1364067" y="3106792"/>
+            <a:ext cx="1862666" cy="430887"/>
+          </a:xfrm>
+          <a:prstGeom prst="rect">
+            <a:avLst/>
+          </a:prstGeom>
+          <a:noFill/>
+        </p:spPr>
+        <p:txBody>
+          <a:bodyPr wrap="square" rtlCol="0">
+            <a:spAutoFit/>
+          </a:bodyPr>
+          <a:lstStyle/>
+          <a:p>
+            <a:r>
+              <a:rPr lang="en-US" sz="2200" b="1" dirty="0">
+                <a:solidFill>
+                  <a:schemeClr val="accent1">
+                    <a:lumMod val="75000"/>
+                  </a:schemeClr>
+                </a:solidFill>
+              </a:rPr>
+              <a:t>ACTIVITIES</a:t>
+            </a:r>
+            <a:endParaRPr lang="en-GB" sz="2200" b="1" dirty="0">
+              <a:solidFill>
+                <a:schemeClr val="accent1">
+                  <a:lumMod val="75000"/>
+                </a:schemeClr>
+              </a:solidFill>
+            </a:endParaRPr>
+          </a:p>
+        </p:txBody>
+      </p:sp>
+    </p:spTree>
+    <p:extLst>
+      <p:ext uri="{BB962C8B-B14F-4D97-AF65-F5344CB8AC3E}">
+        <p14:creationId xmlns:p14="http://schemas.microsoft.com/office/powerpoint/2010/main" val="2182834293"/>
+      </p:ext>
+    </p:extLst>
+  </p:cSld>
+  <p:clrMapOvr>
+    <a:masterClrMapping/>
+  </p:clrMapOvr>
+</p:sld>
+</file>
+
+<file path=ppt/slides/slide4.xml><?xml version="1.0" encoding="utf-8"?>
+<p:sld xmlns:a="http://schemas.openxmlformats.org/drawingml/2006/main" xmlns:r="http://schemas.openxmlformats.org/officeDocument/2006/relationships" xmlns:p="http://schemas.openxmlformats.org/presentationml/2006/main">
+  <p:cSld>
+    <p:spTree>
+      <p:nvGrpSpPr>
+        <p:cNvPr id="1" name=""/>
+        <p:cNvGrpSpPr/>
+        <p:nvPr/>
+      </p:nvGrpSpPr>
+      <p:grpSpPr>
+        <a:xfrm>
+          <a:off x="0" y="0"/>
+          <a:ext cx="0" cy="0"/>
+          <a:chOff x="0" y="0"/>
+          <a:chExt cx="0" cy="0"/>
+        </a:xfrm>
+      </p:grpSpPr>
+      <p:sp>
+        <p:nvSpPr>
+          <p:cNvPr id="7" name="Rectangle 6">
+            <a:extLst>
+              <a:ext uri="{FF2B5EF4-FFF2-40B4-BE49-F238E27FC236}">
+                <a16:creationId xmlns:a16="http://schemas.microsoft.com/office/drawing/2014/main" id="{858D8AC8-9DD0-4CBF-83B9-CB7CDF924A62}"/>
+              </a:ext>
+            </a:extLst>
+          </p:cNvPr>
+          <p:cNvSpPr/>
+          <p:nvPr/>
+        </p:nvSpPr>
+        <p:spPr>
+          <a:xfrm>
+            <a:off x="2726288" y="1919550"/>
+            <a:ext cx="568939" cy="2838193"/>
+          </a:xfrm>
+          <a:prstGeom prst="rect">
+            <a:avLst/>
+          </a:prstGeom>
+          <a:solidFill>
+            <a:schemeClr val="tx1">
+              <a:lumMod val="85000"/>
+              <a:lumOff val="15000"/>
+              <a:alpha val="60000"/>
+            </a:schemeClr>
+          </a:solidFill>
+          <a:ln>
+            <a:noFill/>
+          </a:ln>
+        </p:spPr>
+        <p:style>
+          <a:lnRef idx="2">
+            <a:schemeClr val="accent1">
+              <a:shade val="50000"/>
+            </a:schemeClr>
+          </a:lnRef>
+          <a:fillRef idx="1">
+            <a:schemeClr val="accent1"/>
+          </a:fillRef>
+          <a:effectRef idx="0">
+            <a:schemeClr val="accent1"/>
+          </a:effectRef>
+          <a:fontRef idx="minor">
+            <a:schemeClr val="lt1"/>
+          </a:fontRef>
+        </p:style>
+        <p:txBody>
+          <a:bodyPr rtlCol="0" anchor="ctr"/>
+          <a:lstStyle/>
+          <a:p>
+            <a:pPr algn="ctr"/>
+            <a:endParaRPr lang="en-GB"/>
+          </a:p>
+        </p:txBody>
+      </p:sp>
+      <p:sp>
+        <p:nvSpPr>
+          <p:cNvPr id="8" name="Rectangle 7">
+            <a:extLst>
+              <a:ext uri="{FF2B5EF4-FFF2-40B4-BE49-F238E27FC236}">
+                <a16:creationId xmlns:a16="http://schemas.microsoft.com/office/drawing/2014/main" id="{BAA6F75F-394A-41D9-84D9-3E007D09EB77}"/>
+              </a:ext>
+            </a:extLst>
+          </p:cNvPr>
+          <p:cNvSpPr/>
+          <p:nvPr/>
+        </p:nvSpPr>
+        <p:spPr>
+          <a:xfrm>
+            <a:off x="3847275" y="1919549"/>
+            <a:ext cx="568939" cy="2838193"/>
+          </a:xfrm>
+          <a:prstGeom prst="rect">
+            <a:avLst/>
+          </a:prstGeom>
+          <a:solidFill>
+            <a:schemeClr val="tx1">
+              <a:lumMod val="85000"/>
+              <a:lumOff val="15000"/>
+              <a:alpha val="60000"/>
+            </a:schemeClr>
+          </a:solidFill>
+          <a:ln>
+            <a:noFill/>
+          </a:ln>
+        </p:spPr>
+        <p:style>
+          <a:lnRef idx="2">
+            <a:schemeClr val="accent1">
+              <a:shade val="50000"/>
+            </a:schemeClr>
+          </a:lnRef>
+          <a:fillRef idx="1">
+            <a:schemeClr val="accent1"/>
+          </a:fillRef>
+          <a:effectRef idx="0">
+            <a:schemeClr val="accent1"/>
+          </a:effectRef>
+          <a:fontRef idx="minor">
+            <a:schemeClr val="lt1"/>
+          </a:fontRef>
+        </p:style>
+        <p:txBody>
+          <a:bodyPr rtlCol="0" anchor="ctr"/>
+          <a:lstStyle/>
+          <a:p>
+            <a:pPr algn="ctr"/>
+            <a:endParaRPr lang="en-GB"/>
+          </a:p>
+        </p:txBody>
+      </p:sp>
+      <p:sp>
+        <p:nvSpPr>
+          <p:cNvPr id="9" name="Rectangle 8">
+            <a:extLst>
+              <a:ext uri="{FF2B5EF4-FFF2-40B4-BE49-F238E27FC236}">
+                <a16:creationId xmlns:a16="http://schemas.microsoft.com/office/drawing/2014/main" id="{FBD7D761-01BD-4E49-A2C9-30FBB54486BE}"/>
+              </a:ext>
+            </a:extLst>
+          </p:cNvPr>
+          <p:cNvSpPr/>
+          <p:nvPr/>
+        </p:nvSpPr>
+        <p:spPr>
+          <a:xfrm>
+            <a:off x="4968262" y="1919549"/>
+            <a:ext cx="568939" cy="2838193"/>
+          </a:xfrm>
+          <a:prstGeom prst="rect">
+            <a:avLst/>
+          </a:prstGeom>
+          <a:solidFill>
+            <a:schemeClr val="tx1">
+              <a:lumMod val="85000"/>
+              <a:lumOff val="15000"/>
+              <a:alpha val="60000"/>
+            </a:schemeClr>
+          </a:solidFill>
+          <a:ln>
+            <a:noFill/>
+          </a:ln>
+        </p:spPr>
+        <p:style>
+          <a:lnRef idx="2">
+            <a:schemeClr val="accent1">
+              <a:shade val="50000"/>
+            </a:schemeClr>
+          </a:lnRef>
+          <a:fillRef idx="1">
+            <a:schemeClr val="accent1"/>
+          </a:fillRef>
+          <a:effectRef idx="0">
+            <a:schemeClr val="accent1"/>
+          </a:effectRef>
+          <a:fontRef idx="minor">
+            <a:schemeClr val="lt1"/>
+          </a:fontRef>
+        </p:style>
+        <p:txBody>
+          <a:bodyPr rtlCol="0" anchor="ctr"/>
+          <a:lstStyle/>
+          <a:p>
+            <a:pPr algn="ctr"/>
+            <a:endParaRPr lang="en-GB"/>
+          </a:p>
+        </p:txBody>
+      </p:sp>
+      <p:sp>
+        <p:nvSpPr>
+          <p:cNvPr id="5" name="Rectangle 4">
+            <a:extLst>
+              <a:ext uri="{FF2B5EF4-FFF2-40B4-BE49-F238E27FC236}">
+                <a16:creationId xmlns:a16="http://schemas.microsoft.com/office/drawing/2014/main" id="{CD03F107-D68A-47F5-B257-B9EC3B3CC17B}"/>
+              </a:ext>
+            </a:extLst>
+          </p:cNvPr>
+          <p:cNvSpPr/>
+          <p:nvPr/>
+        </p:nvSpPr>
+        <p:spPr>
+          <a:xfrm>
+            <a:off x="2726288" y="3322237"/>
+            <a:ext cx="3359574" cy="562271"/>
+          </a:xfrm>
+          <a:prstGeom prst="rect">
+            <a:avLst/>
+          </a:prstGeom>
+          <a:solidFill>
+            <a:schemeClr val="tx1">
+              <a:lumMod val="85000"/>
+              <a:lumOff val="15000"/>
+              <a:alpha val="50000"/>
+            </a:schemeClr>
+          </a:solidFill>
+          <a:ln>
+            <a:noFill/>
+          </a:ln>
+        </p:spPr>
+        <p:style>
+          <a:lnRef idx="2">
+            <a:schemeClr val="accent1">
+              <a:shade val="50000"/>
+            </a:schemeClr>
+          </a:lnRef>
+          <a:fillRef idx="1">
+            <a:schemeClr val="accent1"/>
+          </a:fillRef>
+          <a:effectRef idx="0">
+            <a:schemeClr val="accent1"/>
+          </a:effectRef>
+          <a:fontRef idx="minor">
+            <a:schemeClr val="lt1"/>
+          </a:fontRef>
+        </p:style>
+        <p:txBody>
+          <a:bodyPr rtlCol="0" anchor="ctr"/>
+          <a:lstStyle/>
+          <a:p>
+            <a:pPr algn="ctr"/>
+            <a:endParaRPr lang="en-GB"/>
+          </a:p>
+        </p:txBody>
+      </p:sp>
+      <p:sp>
+        <p:nvSpPr>
+          <p:cNvPr id="4" name="Rectangle 3">
+            <a:extLst>
+              <a:ext uri="{FF2B5EF4-FFF2-40B4-BE49-F238E27FC236}">
+                <a16:creationId xmlns:a16="http://schemas.microsoft.com/office/drawing/2014/main" id="{DE4470E8-D52A-42A0-8077-0446137F16B8}"/>
+              </a:ext>
+            </a:extLst>
+          </p:cNvPr>
+          <p:cNvSpPr/>
+          <p:nvPr/>
+        </p:nvSpPr>
+        <p:spPr>
+          <a:xfrm>
+            <a:off x="2726287" y="2449002"/>
+            <a:ext cx="3369713" cy="562271"/>
+          </a:xfrm>
+          <a:prstGeom prst="rect">
+            <a:avLst/>
+          </a:prstGeom>
+          <a:solidFill>
+            <a:schemeClr val="tx1">
+              <a:lumMod val="85000"/>
+              <a:lumOff val="15000"/>
+              <a:alpha val="50000"/>
+            </a:schemeClr>
+          </a:solidFill>
+          <a:ln>
+            <a:noFill/>
+          </a:ln>
+        </p:spPr>
+        <p:style>
+          <a:lnRef idx="2">
+            <a:schemeClr val="accent1">
+              <a:shade val="50000"/>
+            </a:schemeClr>
+          </a:lnRef>
+          <a:fillRef idx="1">
+            <a:schemeClr val="accent1"/>
+          </a:fillRef>
+          <a:effectRef idx="0">
+            <a:schemeClr val="accent1"/>
+          </a:effectRef>
+          <a:fontRef idx="minor">
+            <a:schemeClr val="lt1"/>
+          </a:fontRef>
+        </p:style>
+        <p:txBody>
+          <a:bodyPr rtlCol="0" anchor="ctr"/>
+          <a:lstStyle/>
+          <a:p>
+            <a:pPr algn="ctr"/>
+            <a:endParaRPr lang="en-GB"/>
+          </a:p>
+        </p:txBody>
+      </p:sp>
+      <p:sp>
+        <p:nvSpPr>
+          <p:cNvPr id="6" name="Rectangle 5">
+            <a:extLst>
+              <a:ext uri="{FF2B5EF4-FFF2-40B4-BE49-F238E27FC236}">
+                <a16:creationId xmlns:a16="http://schemas.microsoft.com/office/drawing/2014/main" id="{F647E393-B4B4-4B88-ABAF-9DE78910C812}"/>
+              </a:ext>
+            </a:extLst>
+          </p:cNvPr>
+          <p:cNvSpPr/>
+          <p:nvPr/>
+        </p:nvSpPr>
+        <p:spPr>
+          <a:xfrm>
+            <a:off x="2726288" y="4195472"/>
+            <a:ext cx="3369712" cy="562271"/>
+          </a:xfrm>
+          <a:prstGeom prst="rect">
+            <a:avLst/>
+          </a:prstGeom>
+          <a:solidFill>
+            <a:schemeClr val="tx1">
+              <a:lumMod val="85000"/>
+              <a:lumOff val="15000"/>
+              <a:alpha val="50000"/>
+            </a:schemeClr>
+          </a:solidFill>
+          <a:ln>
+            <a:noFill/>
+          </a:ln>
+        </p:spPr>
+        <p:style>
+          <a:lnRef idx="2">
+            <a:schemeClr val="accent1">
+              <a:shade val="50000"/>
+            </a:schemeClr>
+          </a:lnRef>
+          <a:fillRef idx="1">
+            <a:schemeClr val="accent1"/>
+          </a:fillRef>
+          <a:effectRef idx="0">
+            <a:schemeClr val="accent1"/>
+          </a:effectRef>
+          <a:fontRef idx="minor">
+            <a:schemeClr val="lt1"/>
+          </a:fontRef>
+        </p:style>
+        <p:txBody>
+          <a:bodyPr rtlCol="0" anchor="ctr"/>
+          <a:lstStyle/>
+          <a:p>
+            <a:pPr algn="ctr"/>
+            <a:endParaRPr lang="en-GB"/>
+          </a:p>
+        </p:txBody>
+      </p:sp>
+      <p:sp>
+        <p:nvSpPr>
+          <p:cNvPr id="13" name="TextBox 12">
+            <a:extLst>
+              <a:ext uri="{FF2B5EF4-FFF2-40B4-BE49-F238E27FC236}">
+                <a16:creationId xmlns:a16="http://schemas.microsoft.com/office/drawing/2014/main" id="{C6260498-ECD6-4222-BCC8-53116580F4E8}"/>
+              </a:ext>
+            </a:extLst>
+          </p:cNvPr>
+          <p:cNvSpPr txBox="1"/>
+          <p:nvPr/>
+        </p:nvSpPr>
+        <p:spPr>
+          <a:xfrm>
+            <a:off x="2726286" y="5005493"/>
+            <a:ext cx="6675099" cy="430887"/>
+          </a:xfrm>
+          <a:prstGeom prst="rect">
+            <a:avLst/>
+          </a:prstGeom>
+          <a:noFill/>
+        </p:spPr>
+        <p:txBody>
+          <a:bodyPr wrap="square" rtlCol="0">
+            <a:spAutoFit/>
+          </a:bodyPr>
+          <a:lstStyle/>
+          <a:p>
+            <a:r>
+              <a:rPr lang="en-US" sz="2200" b="1" dirty="0"/>
+              <a:t>COGNITIVE DIMENSIONS</a:t>
+            </a:r>
+            <a:endParaRPr lang="en-GB" sz="2200" b="1" dirty="0"/>
+          </a:p>
+        </p:txBody>
+      </p:sp>
+      <p:sp>
+        <p:nvSpPr>
+          <p:cNvPr id="14" name="TextBox 13">
+            <a:extLst>
+              <a:ext uri="{FF2B5EF4-FFF2-40B4-BE49-F238E27FC236}">
+                <a16:creationId xmlns:a16="http://schemas.microsoft.com/office/drawing/2014/main" id="{A3A6A19B-D338-48EF-BBEC-6A23B4A88AD2}"/>
+              </a:ext>
+            </a:extLst>
+          </p:cNvPr>
+          <p:cNvSpPr txBox="1"/>
+          <p:nvPr/>
+        </p:nvSpPr>
+        <p:spPr>
+          <a:xfrm rot="16200000">
+            <a:off x="1364067" y="3106792"/>
+            <a:ext cx="1862666" cy="430887"/>
+          </a:xfrm>
+          <a:prstGeom prst="rect">
+            <a:avLst/>
+          </a:prstGeom>
+          <a:noFill/>
+        </p:spPr>
+        <p:txBody>
+          <a:bodyPr wrap="square" rtlCol="0">
+            <a:spAutoFit/>
+          </a:bodyPr>
+          <a:lstStyle/>
+          <a:p>
+            <a:r>
+              <a:rPr lang="en-US" sz="2200" b="1" dirty="0"/>
+              <a:t>ACTIVITIES</a:t>
+            </a:r>
+            <a:endParaRPr lang="en-GB" sz="2200" b="1" dirty="0"/>
+          </a:p>
+        </p:txBody>
+      </p:sp>
+    </p:spTree>
+    <p:extLst>
+      <p:ext uri="{BB962C8B-B14F-4D97-AF65-F5344CB8AC3E}">
+        <p14:creationId xmlns:p14="http://schemas.microsoft.com/office/powerpoint/2010/main" val="3791169221"/>
+      </p:ext>
+    </p:extLst>
+  </p:cSld>
+  <p:clrMapOvr>
+    <a:masterClrMapping/>
+  </p:clrMapOvr>
+</p:sld>
+</file>
+
+<file path=ppt/slides/slide5.xml><?xml version="1.0" encoding="utf-8"?>
+<p:sld xmlns:a="http://schemas.openxmlformats.org/drawingml/2006/main" xmlns:r="http://schemas.openxmlformats.org/officeDocument/2006/relationships" xmlns:p="http://schemas.openxmlformats.org/presentationml/2006/main">
+  <p:cSld>
+    <p:spTree>
+      <p:nvGrpSpPr>
+        <p:cNvPr id="1" name=""/>
+        <p:cNvGrpSpPr/>
+        <p:nvPr/>
+      </p:nvGrpSpPr>
+      <p:grpSpPr>
+        <a:xfrm>
+          <a:off x="0" y="0"/>
+          <a:ext cx="0" cy="0"/>
+          <a:chOff x="0" y="0"/>
+          <a:chExt cx="0" cy="0"/>
+        </a:xfrm>
+      </p:grpSpPr>
+      <p:sp>
+        <p:nvSpPr>
+          <p:cNvPr id="5" name="Rectangle 4">
+            <a:extLst>
+              <a:ext uri="{FF2B5EF4-FFF2-40B4-BE49-F238E27FC236}">
+                <a16:creationId xmlns:a16="http://schemas.microsoft.com/office/drawing/2014/main" id="{CD03F107-D68A-47F5-B257-B9EC3B3CC17B}"/>
+              </a:ext>
+            </a:extLst>
+          </p:cNvPr>
+          <p:cNvSpPr/>
+          <p:nvPr/>
+        </p:nvSpPr>
+        <p:spPr>
+          <a:xfrm>
+            <a:off x="2726288" y="3322237"/>
+            <a:ext cx="6675098" cy="562271"/>
+          </a:xfrm>
+          <a:prstGeom prst="rect">
+            <a:avLst/>
+          </a:prstGeom>
+          <a:solidFill>
+            <a:schemeClr val="accent1">
+              <a:alpha val="50000"/>
+            </a:schemeClr>
+          </a:solidFill>
+          <a:ln>
+            <a:noFill/>
+          </a:ln>
+        </p:spPr>
+        <p:style>
+          <a:lnRef idx="2">
+            <a:schemeClr val="accent1">
+              <a:shade val="50000"/>
+            </a:schemeClr>
+          </a:lnRef>
+          <a:fillRef idx="1">
+            <a:schemeClr val="accent1"/>
+          </a:fillRef>
+          <a:effectRef idx="0">
+            <a:schemeClr val="accent1"/>
+          </a:effectRef>
+          <a:fontRef idx="minor">
+            <a:schemeClr val="lt1"/>
+          </a:fontRef>
+        </p:style>
+        <p:txBody>
+          <a:bodyPr rtlCol="0" anchor="ctr"/>
+          <a:lstStyle/>
+          <a:p>
+            <a:pPr algn="ctr"/>
+            <a:endParaRPr lang="en-GB"/>
+          </a:p>
+        </p:txBody>
+      </p:sp>
+      <p:sp>
+        <p:nvSpPr>
+          <p:cNvPr id="4" name="Rectangle 3">
+            <a:extLst>
+              <a:ext uri="{FF2B5EF4-FFF2-40B4-BE49-F238E27FC236}">
+                <a16:creationId xmlns:a16="http://schemas.microsoft.com/office/drawing/2014/main" id="{DE4470E8-D52A-42A0-8077-0446137F16B8}"/>
+              </a:ext>
+            </a:extLst>
+          </p:cNvPr>
+          <p:cNvSpPr/>
+          <p:nvPr/>
+        </p:nvSpPr>
+        <p:spPr>
+          <a:xfrm>
+            <a:off x="2726287" y="2449002"/>
+            <a:ext cx="6675099" cy="562271"/>
+          </a:xfrm>
+          <a:prstGeom prst="rect">
+            <a:avLst/>
+          </a:prstGeom>
+          <a:solidFill>
+            <a:schemeClr val="accent1">
+              <a:alpha val="50000"/>
+            </a:schemeClr>
+          </a:solidFill>
+          <a:ln>
+            <a:noFill/>
+          </a:ln>
+        </p:spPr>
+        <p:style>
+          <a:lnRef idx="2">
+            <a:schemeClr val="accent1">
+              <a:shade val="50000"/>
+            </a:schemeClr>
+          </a:lnRef>
+          <a:fillRef idx="1">
+            <a:schemeClr val="accent1"/>
+          </a:fillRef>
+          <a:effectRef idx="0">
+            <a:schemeClr val="accent1"/>
+          </a:effectRef>
+          <a:fontRef idx="minor">
+            <a:schemeClr val="lt1"/>
+          </a:fontRef>
+        </p:style>
+        <p:txBody>
+          <a:bodyPr rtlCol="0" anchor="ctr"/>
+          <a:lstStyle/>
+          <a:p>
+            <a:pPr algn="ctr"/>
+            <a:endParaRPr lang="en-GB"/>
+          </a:p>
+        </p:txBody>
+      </p:sp>
+      <p:sp>
+        <p:nvSpPr>
+          <p:cNvPr id="6" name="Rectangle 5">
+            <a:extLst>
+              <a:ext uri="{FF2B5EF4-FFF2-40B4-BE49-F238E27FC236}">
+                <a16:creationId xmlns:a16="http://schemas.microsoft.com/office/drawing/2014/main" id="{F647E393-B4B4-4B88-ABAF-9DE78910C812}"/>
+              </a:ext>
+            </a:extLst>
+          </p:cNvPr>
+          <p:cNvSpPr/>
+          <p:nvPr/>
+        </p:nvSpPr>
+        <p:spPr>
+          <a:xfrm>
+            <a:off x="2726288" y="4195472"/>
+            <a:ext cx="6675098" cy="562271"/>
+          </a:xfrm>
+          <a:prstGeom prst="rect">
+            <a:avLst/>
+          </a:prstGeom>
+          <a:solidFill>
+            <a:schemeClr val="accent1">
+              <a:alpha val="50000"/>
+            </a:schemeClr>
+          </a:solidFill>
+          <a:ln>
+            <a:noFill/>
+          </a:ln>
+        </p:spPr>
+        <p:style>
+          <a:lnRef idx="2">
+            <a:schemeClr val="accent1">
+              <a:shade val="50000"/>
+            </a:schemeClr>
+          </a:lnRef>
+          <a:fillRef idx="1">
+            <a:schemeClr val="accent1"/>
+          </a:fillRef>
+          <a:effectRef idx="0">
+            <a:schemeClr val="accent1"/>
+          </a:effectRef>
+          <a:fontRef idx="minor">
+            <a:schemeClr val="lt1"/>
+          </a:fontRef>
+        </p:style>
+        <p:txBody>
+          <a:bodyPr rtlCol="0" anchor="ctr"/>
+          <a:lstStyle/>
+          <a:p>
+            <a:pPr algn="ctr"/>
+            <a:endParaRPr lang="en-GB"/>
+          </a:p>
+        </p:txBody>
+      </p:sp>
+      <p:sp>
+        <p:nvSpPr>
+          <p:cNvPr id="14" name="TextBox 13">
+            <a:extLst>
+              <a:ext uri="{FF2B5EF4-FFF2-40B4-BE49-F238E27FC236}">
+                <a16:creationId xmlns:a16="http://schemas.microsoft.com/office/drawing/2014/main" id="{A3A6A19B-D338-48EF-BBEC-6A23B4A88AD2}"/>
+              </a:ext>
+            </a:extLst>
+          </p:cNvPr>
+          <p:cNvSpPr txBox="1"/>
+          <p:nvPr/>
+        </p:nvSpPr>
+        <p:spPr>
+          <a:xfrm rot="16200000">
+            <a:off x="1364067" y="3106792"/>
+            <a:ext cx="1862666" cy="430887"/>
+          </a:xfrm>
+          <a:prstGeom prst="rect">
+            <a:avLst/>
+          </a:prstGeom>
+          <a:noFill/>
+        </p:spPr>
+        <p:txBody>
+          <a:bodyPr wrap="square" rtlCol="0">
+            <a:spAutoFit/>
+          </a:bodyPr>
+          <a:lstStyle/>
+          <a:p>
+            <a:r>
+              <a:rPr lang="en-US" sz="2200" b="1" dirty="0">
+                <a:solidFill>
+                  <a:schemeClr val="accent1">
+                    <a:lumMod val="75000"/>
+                  </a:schemeClr>
+                </a:solidFill>
+              </a:rPr>
+              <a:t>ACTIVITIES</a:t>
+            </a:r>
+            <a:endParaRPr lang="en-GB" sz="2200" b="1" dirty="0">
+              <a:solidFill>
+                <a:schemeClr val="accent1">
+                  <a:lumMod val="75000"/>
+                </a:schemeClr>
+              </a:solidFill>
+            </a:endParaRPr>
+          </a:p>
+        </p:txBody>
+      </p:sp>
+    </p:spTree>
+    <p:extLst>
+      <p:ext uri="{BB962C8B-B14F-4D97-AF65-F5344CB8AC3E}">
+        <p14:creationId xmlns:p14="http://schemas.microsoft.com/office/powerpoint/2010/main" val="1609215460"/>
+      </p:ext>
+    </p:extLst>
+  </p:cSld>
+  <p:clrMapOvr>
+    <a:masterClrMapping/>
+  </p:clrMapOvr>
+</p:sld>
+</file>
+
+<file path=ppt/slides/slide6.xml><?xml version="1.0" encoding="utf-8"?>
+<p:sld xmlns:a="http://schemas.openxmlformats.org/drawingml/2006/main" xmlns:r="http://schemas.openxmlformats.org/officeDocument/2006/relationships" xmlns:p="http://schemas.openxmlformats.org/presentationml/2006/main">
+  <p:cSld>
+    <p:spTree>
+      <p:nvGrpSpPr>
+        <p:cNvPr id="1" name=""/>
+        <p:cNvGrpSpPr/>
+        <p:nvPr/>
+      </p:nvGrpSpPr>
+      <p:grpSpPr>
+        <a:xfrm>
+          <a:off x="0" y="0"/>
+          <a:ext cx="0" cy="0"/>
+          <a:chOff x="0" y="0"/>
+          <a:chExt cx="0" cy="0"/>
+        </a:xfrm>
+      </p:grpSpPr>
+      <p:pic>
+        <p:nvPicPr>
+          <p:cNvPr id="16" name="Picture 15">
+            <a:extLst>
+              <a:ext uri="{FF2B5EF4-FFF2-40B4-BE49-F238E27FC236}">
+                <a16:creationId xmlns:a16="http://schemas.microsoft.com/office/drawing/2014/main" id="{78E8DCAA-32E7-4F28-B698-F3D49B419735}"/>
+              </a:ext>
+            </a:extLst>
+          </p:cNvPr>
+          <p:cNvPicPr>
+            <a:picLocks noChangeAspect="1"/>
+          </p:cNvPicPr>
+          <p:nvPr/>
+        </p:nvPicPr>
+        <p:blipFill>
+          <a:blip r:embed="rId2"/>
+          <a:stretch>
+            <a:fillRect/>
+          </a:stretch>
+        </p:blipFill>
+        <p:spPr>
+          <a:xfrm>
+            <a:off x="6183924" y="1069349"/>
+            <a:ext cx="1625730" cy="1625730"/>
+          </a:xfrm>
+          <a:prstGeom prst="rect">
+            <a:avLst/>
+          </a:prstGeom>
+        </p:spPr>
+      </p:pic>
+      <p:pic>
+        <p:nvPicPr>
+          <p:cNvPr id="17" name="Picture 16">
+            <a:extLst>
+              <a:ext uri="{FF2B5EF4-FFF2-40B4-BE49-F238E27FC236}">
+                <a16:creationId xmlns:a16="http://schemas.microsoft.com/office/drawing/2014/main" id="{1AB8EACB-F81E-496C-9D73-5225DBBD906A}"/>
+              </a:ext>
+            </a:extLst>
+          </p:cNvPr>
+          <p:cNvPicPr>
+            <a:picLocks noChangeAspect="1"/>
+          </p:cNvPicPr>
+          <p:nvPr/>
+        </p:nvPicPr>
+        <p:blipFill>
+          <a:blip r:embed="rId3"/>
+          <a:stretch>
+            <a:fillRect/>
+          </a:stretch>
+        </p:blipFill>
+        <p:spPr>
+          <a:xfrm>
+            <a:off x="2709222" y="1069349"/>
+            <a:ext cx="1438282" cy="1731593"/>
+          </a:xfrm>
+          <a:prstGeom prst="rect">
+            <a:avLst/>
+          </a:prstGeom>
+        </p:spPr>
+      </p:pic>
+      <p:pic>
+        <p:nvPicPr>
+          <p:cNvPr id="22" name="Picture 21">
+            <a:extLst>
+              <a:ext uri="{FF2B5EF4-FFF2-40B4-BE49-F238E27FC236}">
+                <a16:creationId xmlns:a16="http://schemas.microsoft.com/office/drawing/2014/main" id="{3B4F178E-6910-4DC9-8481-3C1B881932D7}"/>
+              </a:ext>
+            </a:extLst>
+          </p:cNvPr>
+          <p:cNvPicPr>
+            <a:picLocks noChangeAspect="1"/>
+          </p:cNvPicPr>
+          <p:nvPr/>
+        </p:nvPicPr>
+        <p:blipFill>
+          <a:blip r:embed="rId3"/>
+          <a:stretch>
+            <a:fillRect/>
+          </a:stretch>
+        </p:blipFill>
+        <p:spPr>
+          <a:xfrm flipH="1">
+            <a:off x="6371373" y="4527534"/>
+            <a:ext cx="1438281" cy="1731593"/>
+          </a:xfrm>
+          <a:prstGeom prst="rect">
+            <a:avLst/>
+          </a:prstGeom>
+        </p:spPr>
+      </p:pic>
+      <p:pic>
+        <p:nvPicPr>
+          <p:cNvPr id="24" name="Picture 23">
+            <a:extLst>
+              <a:ext uri="{FF2B5EF4-FFF2-40B4-BE49-F238E27FC236}">
+                <a16:creationId xmlns:a16="http://schemas.microsoft.com/office/drawing/2014/main" id="{2362AF3C-4FEA-4238-90B0-ECF33A1B5D72}"/>
+              </a:ext>
+            </a:extLst>
+          </p:cNvPr>
+          <p:cNvPicPr>
+            <a:picLocks noChangeAspect="1"/>
+          </p:cNvPicPr>
+          <p:nvPr/>
+        </p:nvPicPr>
+        <p:blipFill>
+          <a:blip r:embed="rId4"/>
+          <a:stretch>
+            <a:fillRect/>
+          </a:stretch>
+        </p:blipFill>
+        <p:spPr>
+          <a:xfrm>
+            <a:off x="4187175" y="2330466"/>
+            <a:ext cx="2331975" cy="2323109"/>
+          </a:xfrm>
+          <a:prstGeom prst="rect">
+            <a:avLst/>
+          </a:prstGeom>
+        </p:spPr>
+      </p:pic>
+      <p:pic>
+        <p:nvPicPr>
+          <p:cNvPr id="26" name="Picture 25">
+            <a:extLst>
+              <a:ext uri="{FF2B5EF4-FFF2-40B4-BE49-F238E27FC236}">
+                <a16:creationId xmlns:a16="http://schemas.microsoft.com/office/drawing/2014/main" id="{CA50DD22-3FFF-4B1A-BD02-A4CEE5CA1515}"/>
+              </a:ext>
+            </a:extLst>
+          </p:cNvPr>
+          <p:cNvPicPr>
+            <a:picLocks noChangeAspect="1"/>
+          </p:cNvPicPr>
+          <p:nvPr/>
+        </p:nvPicPr>
+        <p:blipFill>
+          <a:blip r:embed="rId2"/>
+          <a:stretch>
+            <a:fillRect/>
+          </a:stretch>
+        </p:blipFill>
+        <p:spPr>
+          <a:xfrm>
+            <a:off x="2709222" y="4527534"/>
+            <a:ext cx="1625730" cy="1625730"/>
+          </a:xfrm>
+          <a:prstGeom prst="rect">
+            <a:avLst/>
+          </a:prstGeom>
+        </p:spPr>
+      </p:pic>
+    </p:spTree>
+    <p:extLst>
+      <p:ext uri="{BB962C8B-B14F-4D97-AF65-F5344CB8AC3E}">
+        <p14:creationId xmlns:p14="http://schemas.microsoft.com/office/powerpoint/2010/main" val="2965132431"/>
+      </p:ext>
+    </p:extLst>
+  </p:cSld>
+  <p:clrMapOvr>
+    <a:masterClrMapping/>
+  </p:clrMapOvr>
+</p:sld>
+</file>
+
+<file path=ppt/slides/slide7.xml><?xml version="1.0" encoding="utf-8"?>
+<p:sld xmlns:a="http://schemas.openxmlformats.org/drawingml/2006/main" xmlns:r="http://schemas.openxmlformats.org/officeDocument/2006/relationships" xmlns:p="http://schemas.openxmlformats.org/presentationml/2006/main">
+  <p:cSld>
+    <p:spTree>
+      <p:nvGrpSpPr>
+        <p:cNvPr id="1" name=""/>
+        <p:cNvGrpSpPr/>
+        <p:nvPr/>
+      </p:nvGrpSpPr>
+      <p:grpSpPr>
+        <a:xfrm>
+          <a:off x="0" y="0"/>
+          <a:ext cx="0" cy="0"/>
+          <a:chOff x="0" y="0"/>
+          <a:chExt cx="0" cy="0"/>
+        </a:xfrm>
+      </p:grpSpPr>
+      <p:pic>
+        <p:nvPicPr>
+          <p:cNvPr id="16" name="Picture 15">
+            <a:extLst>
+              <a:ext uri="{FF2B5EF4-FFF2-40B4-BE49-F238E27FC236}">
+                <a16:creationId xmlns:a16="http://schemas.microsoft.com/office/drawing/2014/main" id="{78E8DCAA-32E7-4F28-B698-F3D49B419735}"/>
+              </a:ext>
+            </a:extLst>
+          </p:cNvPr>
+          <p:cNvPicPr>
+            <a:picLocks noChangeAspect="1"/>
+          </p:cNvPicPr>
+          <p:nvPr/>
+        </p:nvPicPr>
+        <p:blipFill>
+          <a:blip r:embed="rId2"/>
+          <a:stretch>
+            <a:fillRect/>
+          </a:stretch>
+        </p:blipFill>
+        <p:spPr>
+          <a:xfrm>
+            <a:off x="6183924" y="1069349"/>
+            <a:ext cx="1625730" cy="1625730"/>
+          </a:xfrm>
+          <a:prstGeom prst="rect">
+            <a:avLst/>
+          </a:prstGeom>
+        </p:spPr>
+      </p:pic>
+      <p:pic>
+        <p:nvPicPr>
+          <p:cNvPr id="17" name="Picture 16">
+            <a:extLst>
+              <a:ext uri="{FF2B5EF4-FFF2-40B4-BE49-F238E27FC236}">
+                <a16:creationId xmlns:a16="http://schemas.microsoft.com/office/drawing/2014/main" id="{1AB8EACB-F81E-496C-9D73-5225DBBD906A}"/>
+              </a:ext>
+            </a:extLst>
+          </p:cNvPr>
+          <p:cNvPicPr>
+            <a:picLocks noChangeAspect="1"/>
+          </p:cNvPicPr>
+          <p:nvPr/>
+        </p:nvPicPr>
+        <p:blipFill>
+          <a:blip r:embed="rId3"/>
+          <a:stretch>
+            <a:fillRect/>
+          </a:stretch>
+        </p:blipFill>
+        <p:spPr>
+          <a:xfrm>
+            <a:off x="2709222" y="1069349"/>
+            <a:ext cx="1438282" cy="1731593"/>
+          </a:xfrm>
+          <a:prstGeom prst="rect">
+            <a:avLst/>
+          </a:prstGeom>
+        </p:spPr>
+      </p:pic>
+      <p:pic>
+        <p:nvPicPr>
+          <p:cNvPr id="19" name="Picture 18">
+            <a:extLst>
+              <a:ext uri="{FF2B5EF4-FFF2-40B4-BE49-F238E27FC236}">
+                <a16:creationId xmlns:a16="http://schemas.microsoft.com/office/drawing/2014/main" id="{C6801358-5277-44C3-96D2-B7BD8DC4A293}"/>
+              </a:ext>
+            </a:extLst>
+          </p:cNvPr>
+          <p:cNvPicPr>
+            <a:picLocks noChangeAspect="1"/>
+          </p:cNvPicPr>
+          <p:nvPr/>
+        </p:nvPicPr>
+        <p:blipFill>
+          <a:blip r:embed="rId4"/>
+          <a:stretch>
+            <a:fillRect/>
+          </a:stretch>
+        </p:blipFill>
+        <p:spPr>
+          <a:xfrm>
+            <a:off x="2964155" y="1246743"/>
+            <a:ext cx="778558" cy="778558"/>
+          </a:xfrm>
+          <a:prstGeom prst="rect">
+            <a:avLst/>
+          </a:prstGeom>
+        </p:spPr>
+      </p:pic>
+      <p:pic>
+        <p:nvPicPr>
+          <p:cNvPr id="21" name="Picture 20">
+            <a:extLst>
+              <a:ext uri="{FF2B5EF4-FFF2-40B4-BE49-F238E27FC236}">
+                <a16:creationId xmlns:a16="http://schemas.microsoft.com/office/drawing/2014/main" id="{13D302FA-6154-4E12-A3BF-8610C5291AD6}"/>
+              </a:ext>
+            </a:extLst>
+          </p:cNvPr>
+          <p:cNvPicPr>
+            <a:picLocks noChangeAspect="1"/>
+          </p:cNvPicPr>
+          <p:nvPr/>
+        </p:nvPicPr>
+        <p:blipFill>
+          <a:blip r:embed="rId4"/>
+          <a:stretch>
+            <a:fillRect/>
+          </a:stretch>
+        </p:blipFill>
+        <p:spPr>
+          <a:xfrm>
+            <a:off x="6607510" y="1351730"/>
+            <a:ext cx="778558" cy="778558"/>
+          </a:xfrm>
+          <a:prstGeom prst="rect">
+            <a:avLst/>
+          </a:prstGeom>
+        </p:spPr>
+      </p:pic>
+      <p:pic>
+        <p:nvPicPr>
+          <p:cNvPr id="22" name="Picture 21">
+            <a:extLst>
+              <a:ext uri="{FF2B5EF4-FFF2-40B4-BE49-F238E27FC236}">
+                <a16:creationId xmlns:a16="http://schemas.microsoft.com/office/drawing/2014/main" id="{3B4F178E-6910-4DC9-8481-3C1B881932D7}"/>
+              </a:ext>
+            </a:extLst>
+          </p:cNvPr>
+          <p:cNvPicPr>
+            <a:picLocks noChangeAspect="1"/>
+          </p:cNvPicPr>
+          <p:nvPr/>
+        </p:nvPicPr>
+        <p:blipFill>
+          <a:blip r:embed="rId3"/>
+          <a:stretch>
+            <a:fillRect/>
+          </a:stretch>
+        </p:blipFill>
+        <p:spPr>
+          <a:xfrm flipH="1">
+            <a:off x="6371373" y="4527534"/>
+            <a:ext cx="1438281" cy="1731593"/>
+          </a:xfrm>
+          <a:prstGeom prst="rect">
+            <a:avLst/>
+          </a:prstGeom>
+        </p:spPr>
+      </p:pic>
+      <p:pic>
+        <p:nvPicPr>
+          <p:cNvPr id="23" name="Picture 22">
+            <a:extLst>
+              <a:ext uri="{FF2B5EF4-FFF2-40B4-BE49-F238E27FC236}">
+                <a16:creationId xmlns:a16="http://schemas.microsoft.com/office/drawing/2014/main" id="{AE0DFE84-7601-44CD-9232-4545038B1E1E}"/>
+              </a:ext>
+            </a:extLst>
+          </p:cNvPr>
+          <p:cNvPicPr>
+            <a:picLocks noChangeAspect="1"/>
+          </p:cNvPicPr>
+          <p:nvPr/>
+        </p:nvPicPr>
+        <p:blipFill>
+          <a:blip r:embed="rId4"/>
+          <a:stretch>
+            <a:fillRect/>
+          </a:stretch>
+        </p:blipFill>
+        <p:spPr>
+          <a:xfrm>
+            <a:off x="6701234" y="4792982"/>
+            <a:ext cx="778558" cy="778558"/>
+          </a:xfrm>
+          <a:prstGeom prst="rect">
+            <a:avLst/>
+          </a:prstGeom>
+        </p:spPr>
+      </p:pic>
+      <p:pic>
+        <p:nvPicPr>
+          <p:cNvPr id="24" name="Picture 23">
+            <a:extLst>
+              <a:ext uri="{FF2B5EF4-FFF2-40B4-BE49-F238E27FC236}">
+                <a16:creationId xmlns:a16="http://schemas.microsoft.com/office/drawing/2014/main" id="{2362AF3C-4FEA-4238-90B0-ECF33A1B5D72}"/>
+              </a:ext>
+            </a:extLst>
+          </p:cNvPr>
+          <p:cNvPicPr>
+            <a:picLocks noChangeAspect="1"/>
+          </p:cNvPicPr>
+          <p:nvPr/>
+        </p:nvPicPr>
+        <p:blipFill>
+          <a:blip r:embed="rId5"/>
+          <a:stretch>
+            <a:fillRect/>
+          </a:stretch>
+        </p:blipFill>
+        <p:spPr>
+          <a:xfrm>
+            <a:off x="4187175" y="2330466"/>
+            <a:ext cx="2331975" cy="2323109"/>
+          </a:xfrm>
+          <a:prstGeom prst="rect">
+            <a:avLst/>
+          </a:prstGeom>
+        </p:spPr>
+      </p:pic>
+      <p:pic>
+        <p:nvPicPr>
+          <p:cNvPr id="25" name="Picture 24">
+            <a:extLst>
+              <a:ext uri="{FF2B5EF4-FFF2-40B4-BE49-F238E27FC236}">
+                <a16:creationId xmlns:a16="http://schemas.microsoft.com/office/drawing/2014/main" id="{CF8AF263-ACCA-43FB-87F7-B35B8E70DFBD}"/>
+              </a:ext>
+            </a:extLst>
+          </p:cNvPr>
+          <p:cNvPicPr>
+            <a:picLocks noChangeAspect="1"/>
+          </p:cNvPicPr>
+          <p:nvPr/>
+        </p:nvPicPr>
+        <p:blipFill>
+          <a:blip r:embed="rId4"/>
+          <a:stretch>
+            <a:fillRect/>
+          </a:stretch>
+        </p:blipFill>
+        <p:spPr>
+          <a:xfrm>
+            <a:off x="4963883" y="3036005"/>
+            <a:ext cx="778558" cy="778558"/>
+          </a:xfrm>
+          <a:prstGeom prst="rect">
+            <a:avLst/>
+          </a:prstGeom>
+        </p:spPr>
+      </p:pic>
+      <p:pic>
+        <p:nvPicPr>
+          <p:cNvPr id="26" name="Picture 25">
+            <a:extLst>
+              <a:ext uri="{FF2B5EF4-FFF2-40B4-BE49-F238E27FC236}">
+                <a16:creationId xmlns:a16="http://schemas.microsoft.com/office/drawing/2014/main" id="{CA50DD22-3FFF-4B1A-BD02-A4CEE5CA1515}"/>
+              </a:ext>
+            </a:extLst>
+          </p:cNvPr>
+          <p:cNvPicPr>
+            <a:picLocks noChangeAspect="1"/>
+          </p:cNvPicPr>
+          <p:nvPr/>
+        </p:nvPicPr>
+        <p:blipFill>
+          <a:blip r:embed="rId2"/>
+          <a:stretch>
+            <a:fillRect/>
+          </a:stretch>
+        </p:blipFill>
+        <p:spPr>
+          <a:xfrm>
+            <a:off x="2709222" y="4527534"/>
+            <a:ext cx="1625730" cy="1625730"/>
+          </a:xfrm>
+          <a:prstGeom prst="rect">
+            <a:avLst/>
+          </a:prstGeom>
+        </p:spPr>
+      </p:pic>
+      <p:pic>
+        <p:nvPicPr>
+          <p:cNvPr id="27" name="Picture 26">
+            <a:extLst>
+              <a:ext uri="{FF2B5EF4-FFF2-40B4-BE49-F238E27FC236}">
+                <a16:creationId xmlns:a16="http://schemas.microsoft.com/office/drawing/2014/main" id="{89B40D4A-1ACE-437A-82B3-F42C79A07CFD}"/>
+              </a:ext>
+            </a:extLst>
+          </p:cNvPr>
+          <p:cNvPicPr>
+            <a:picLocks noChangeAspect="1"/>
+          </p:cNvPicPr>
+          <p:nvPr/>
+        </p:nvPicPr>
+        <p:blipFill>
+          <a:blip r:embed="rId4"/>
+          <a:stretch>
+            <a:fillRect/>
+          </a:stretch>
+        </p:blipFill>
+        <p:spPr>
+          <a:xfrm>
+            <a:off x="3132808" y="4809915"/>
+            <a:ext cx="778558" cy="778558"/>
+          </a:xfrm>
+          <a:prstGeom prst="rect">
+            <a:avLst/>
+          </a:prstGeom>
+        </p:spPr>
+      </p:pic>
+      <p:cxnSp>
+        <p:nvCxnSpPr>
+          <p:cNvPr id="4" name="Straight Connector 3">
+            <a:extLst>
+              <a:ext uri="{FF2B5EF4-FFF2-40B4-BE49-F238E27FC236}">
+                <a16:creationId xmlns:a16="http://schemas.microsoft.com/office/drawing/2014/main" id="{94FC6937-E761-4E5F-A81A-83A4822FA6CC}"/>
+              </a:ext>
+            </a:extLst>
+          </p:cNvPr>
+          <p:cNvCxnSpPr/>
+          <p:nvPr/>
+        </p:nvCxnSpPr>
+        <p:spPr>
+          <a:xfrm>
+            <a:off x="4402667" y="1582023"/>
+            <a:ext cx="1544320" cy="0"/>
+          </a:xfrm>
+          <a:prstGeom prst="line">
+            <a:avLst/>
+          </a:prstGeom>
+          <a:ln w="57150">
+            <a:solidFill>
+              <a:schemeClr val="tx1"/>
+            </a:solidFill>
+          </a:ln>
+        </p:spPr>
+        <p:style>
+          <a:lnRef idx="1">
+            <a:schemeClr val="accent1"/>
+          </a:lnRef>
+          <a:fillRef idx="0">
+            <a:schemeClr val="accent1"/>
+          </a:fillRef>
+          <a:effectRef idx="0">
+            <a:schemeClr val="accent1"/>
+          </a:effectRef>
+          <a:fontRef idx="minor">
+            <a:schemeClr val="tx1"/>
+          </a:fontRef>
+        </p:style>
+      </p:cxnSp>
+      <p:cxnSp>
+        <p:nvCxnSpPr>
+          <p:cNvPr id="15" name="Straight Connector 14">
+            <a:extLst>
+              <a:ext uri="{FF2B5EF4-FFF2-40B4-BE49-F238E27FC236}">
+                <a16:creationId xmlns:a16="http://schemas.microsoft.com/office/drawing/2014/main" id="{32700D25-07B6-48EF-9518-598A8DAACE4B}"/>
+              </a:ext>
+            </a:extLst>
+          </p:cNvPr>
+          <p:cNvCxnSpPr/>
+          <p:nvPr/>
+        </p:nvCxnSpPr>
+        <p:spPr>
+          <a:xfrm>
+            <a:off x="4639604" y="5324289"/>
+            <a:ext cx="1544320" cy="0"/>
+          </a:xfrm>
+          <a:prstGeom prst="line">
+            <a:avLst/>
+          </a:prstGeom>
+          <a:ln w="57150">
+            <a:solidFill>
+              <a:schemeClr val="tx1"/>
+            </a:solidFill>
+          </a:ln>
+        </p:spPr>
+        <p:style>
+          <a:lnRef idx="1">
+            <a:schemeClr val="accent1"/>
+          </a:lnRef>
+          <a:fillRef idx="0">
+            <a:schemeClr val="accent1"/>
+          </a:fillRef>
+          <a:effectRef idx="0">
+            <a:schemeClr val="accent1"/>
+          </a:effectRef>
+          <a:fontRef idx="minor">
+            <a:schemeClr val="tx1"/>
+          </a:fontRef>
+        </p:style>
+      </p:cxnSp>
+      <p:cxnSp>
+        <p:nvCxnSpPr>
+          <p:cNvPr id="18" name="Straight Connector 17">
+            <a:extLst>
+              <a:ext uri="{FF2B5EF4-FFF2-40B4-BE49-F238E27FC236}">
+                <a16:creationId xmlns:a16="http://schemas.microsoft.com/office/drawing/2014/main" id="{954AAB8A-77C9-4C51-99A5-550A46928A09}"/>
+              </a:ext>
+            </a:extLst>
+          </p:cNvPr>
+          <p:cNvCxnSpPr>
+            <a:cxnSpLocks/>
+          </p:cNvCxnSpPr>
+          <p:nvPr/>
+        </p:nvCxnSpPr>
+        <p:spPr>
+          <a:xfrm flipV="1">
+            <a:off x="6096000" y="2695079"/>
+            <a:ext cx="487680" cy="393561"/>
+          </a:xfrm>
+          <a:prstGeom prst="line">
+            <a:avLst/>
+          </a:prstGeom>
+          <a:ln w="57150">
+            <a:solidFill>
+              <a:schemeClr val="tx1"/>
+            </a:solidFill>
+          </a:ln>
+        </p:spPr>
+        <p:style>
+          <a:lnRef idx="1">
+            <a:schemeClr val="accent1"/>
+          </a:lnRef>
+          <a:fillRef idx="0">
+            <a:schemeClr val="accent1"/>
+          </a:fillRef>
+          <a:effectRef idx="0">
+            <a:schemeClr val="accent1"/>
+          </a:effectRef>
+          <a:fontRef idx="minor">
+            <a:schemeClr val="tx1"/>
+          </a:fontRef>
+        </p:style>
+      </p:cxnSp>
+      <p:cxnSp>
+        <p:nvCxnSpPr>
+          <p:cNvPr id="20" name="Straight Connector 19">
+            <a:extLst>
+              <a:ext uri="{FF2B5EF4-FFF2-40B4-BE49-F238E27FC236}">
+                <a16:creationId xmlns:a16="http://schemas.microsoft.com/office/drawing/2014/main" id="{A8D4BF82-463E-46F9-AE3A-C62308DBD4F8}"/>
+              </a:ext>
+            </a:extLst>
+          </p:cNvPr>
+          <p:cNvCxnSpPr>
+            <a:cxnSpLocks/>
+          </p:cNvCxnSpPr>
+          <p:nvPr/>
+        </p:nvCxnSpPr>
+        <p:spPr>
+          <a:xfrm flipV="1">
+            <a:off x="3742713" y="4025588"/>
+            <a:ext cx="487680" cy="393561"/>
+          </a:xfrm>
+          <a:prstGeom prst="line">
+            <a:avLst/>
+          </a:prstGeom>
+          <a:ln w="57150">
+            <a:solidFill>
+              <a:schemeClr val="tx1"/>
+            </a:solidFill>
+          </a:ln>
+        </p:spPr>
+        <p:style>
+          <a:lnRef idx="1">
+            <a:schemeClr val="accent1"/>
+          </a:lnRef>
+          <a:fillRef idx="0">
+            <a:schemeClr val="accent1"/>
+          </a:fillRef>
+          <a:effectRef idx="0">
+            <a:schemeClr val="accent1"/>
+          </a:effectRef>
+          <a:fontRef idx="minor">
+            <a:schemeClr val="tx1"/>
+          </a:fontRef>
+        </p:style>
+      </p:cxnSp>
+    </p:spTree>
+    <p:extLst>
+      <p:ext uri="{BB962C8B-B14F-4D97-AF65-F5344CB8AC3E}">
+        <p14:creationId xmlns:p14="http://schemas.microsoft.com/office/powerpoint/2010/main" val="94732157"/>
+      </p:ext>
+    </p:extLst>
+  </p:cSld>
+  <p:clrMapOvr>
+    <a:masterClrMapping/>
+  </p:clrMapOvr>
+</p:sld>
+</file>
+
 <file path=ppt/theme/theme1.xml><?xml version="1.0" encoding="utf-8"?>
 <a:theme xmlns:a="http://schemas.openxmlformats.org/drawingml/2006/main" name="Office Theme">
   <a:themeElements>

</xml_diff>